<commit_message>
Update Autonomous traffic system presentation.pptx
</commit_message>
<xml_diff>
--- a/Autonomous traffic system presentation.pptx
+++ b/Autonomous traffic system presentation.pptx
@@ -12,9 +12,12 @@
     <p:sldId id="266" r:id="rId6"/>
     <p:sldId id="268" r:id="rId7"/>
     <p:sldId id="262" r:id="rId8"/>
-    <p:sldId id="269" r:id="rId9"/>
-    <p:sldId id="267" r:id="rId10"/>
-    <p:sldId id="260" r:id="rId11"/>
+    <p:sldId id="274" r:id="rId9"/>
+    <p:sldId id="269" r:id="rId10"/>
+    <p:sldId id="273" r:id="rId11"/>
+    <p:sldId id="267" r:id="rId12"/>
+    <p:sldId id="260" r:id="rId13"/>
+    <p:sldId id="271" r:id="rId14"/>
   </p:sldIdLst>
   <p:sldSz cx="12192000" cy="6858000"/>
   <p:notesSz cx="6858000" cy="9144000"/>
@@ -113,6 +116,11 @@
       </a:defRPr>
     </a:lvl9pPr>
   </p:defaultTextStyle>
+  <p:extLst>
+    <p:ext uri="{EFAFB233-063F-42B5-8137-9DF3F51BA10A}">
+      <p15:sldGuideLst xmlns:p15="http://schemas.microsoft.com/office/powerpoint/2012/main"/>
+    </p:ext>
+  </p:extLst>
 </p:presentation>
 </file>
 
@@ -3674,6 +3682,14 @@
 <file path=ppt/slides/slide10.xml><?xml version="1.0" encoding="utf-8"?>
 <p:sld xmlns:a="http://schemas.openxmlformats.org/drawingml/2006/main" xmlns:r="http://schemas.openxmlformats.org/officeDocument/2006/relationships" xmlns:p="http://schemas.openxmlformats.org/presentationml/2006/main">
   <p:cSld>
+    <p:bg>
+      <p:bgPr>
+        <a:solidFill>
+          <a:schemeClr val="bg1"/>
+        </a:solidFill>
+        <a:effectLst/>
+      </p:bgPr>
+    </p:bg>
     <p:spTree>
       <p:nvGrpSpPr>
         <p:cNvPr id="1" name=""/>
@@ -3688,414 +3704,37 @@
           <a:chExt cx="0" cy="0"/>
         </a:xfrm>
       </p:grpSpPr>
-      <p:sp>
-        <p:nvSpPr>
-          <p:cNvPr id="19" name="Rectangle: Rounded Corners 18">
-            <a:extLst>
-              <a:ext uri="{FF2B5EF4-FFF2-40B4-BE49-F238E27FC236}">
-                <a16:creationId xmlns:a16="http://schemas.microsoft.com/office/drawing/2014/main" id="{FE88D303-E063-4235-EBBC-82AACEAED374}"/>
-              </a:ext>
-            </a:extLst>
-          </p:cNvPr>
-          <p:cNvSpPr/>
-          <p:nvPr/>
-        </p:nvSpPr>
-        <p:spPr>
-          <a:xfrm>
-            <a:off x="502418" y="1893990"/>
-            <a:ext cx="2870200" cy="3125627"/>
-          </a:xfrm>
-          <a:prstGeom prst="roundRect">
+      <p:sp useBgFill="1">
+        <p:nvSpPr>
+          <p:cNvPr id="23" name="Rectangle 22">
+            <a:extLst>
+              <a:ext uri="{FF2B5EF4-FFF2-40B4-BE49-F238E27FC236}">
+                <a16:creationId xmlns:a16="http://schemas.microsoft.com/office/drawing/2014/main" id="{017517EF-BD4D-4055-BDB4-A322C53568AD}"/>
+              </a:ext>
+              <a:ext uri="{C183D7F6-B498-43B3-948B-1728B52AA6E4}">
+                <adec:decorative xmlns:adec="http://schemas.microsoft.com/office/drawing/2017/decorative" val="1"/>
+              </a:ext>
+            </a:extLst>
+          </p:cNvPr>
+          <p:cNvSpPr>
+            <a:spLocks noGrp="1" noRot="1" noChangeAspect="1" noMove="1" noResize="1" noEditPoints="1" noAdjustHandles="1" noChangeArrowheads="1" noChangeShapeType="1" noTextEdit="1"/>
+          </p:cNvSpPr>
+          <p:nvPr>
+            <p:extLst>
+              <p:ext uri="{386F3935-93C4-4BCD-93E2-E3B085C9AB24}">
+                <p16:designElem xmlns:p16="http://schemas.microsoft.com/office/powerpoint/2015/main" val="1"/>
+              </p:ext>
+            </p:extLst>
+          </p:nvPr>
+        </p:nvSpPr>
+        <p:spPr>
+          <a:xfrm>
+            <a:off x="0" y="0"/>
+            <a:ext cx="12192000" cy="6858000"/>
+          </a:xfrm>
+          <a:prstGeom prst="rect">
             <a:avLst/>
           </a:prstGeom>
-          <a:solidFill>
-            <a:schemeClr val="accent4">
-              <a:lumMod val="20000"/>
-              <a:lumOff val="80000"/>
-              <a:alpha val="50000"/>
-            </a:schemeClr>
-          </a:solidFill>
-          <a:ln>
-            <a:noFill/>
-          </a:ln>
-        </p:spPr>
-        <p:style>
-          <a:lnRef idx="0">
-            <a:scrgbClr r="0" g="0" b="0"/>
-          </a:lnRef>
-          <a:fillRef idx="0">
-            <a:scrgbClr r="0" g="0" b="0"/>
-          </a:fillRef>
-          <a:effectRef idx="0">
-            <a:scrgbClr r="0" g="0" b="0"/>
-          </a:effectRef>
-          <a:fontRef idx="minor">
-            <a:schemeClr val="lt1"/>
-          </a:fontRef>
-        </p:style>
-        <p:txBody>
-          <a:bodyPr rtlCol="0" anchor="ctr"/>
-          <a:lstStyle/>
-          <a:p>
-            <a:pPr algn="ctr"/>
-            <a:endParaRPr lang="LID4096" dirty="0">
-              <a:solidFill>
-                <a:schemeClr val="bg1"/>
-              </a:solidFill>
-            </a:endParaRPr>
-          </a:p>
-        </p:txBody>
-      </p:sp>
-      <p:sp>
-        <p:nvSpPr>
-          <p:cNvPr id="20" name="Rectangle: Rounded Corners 19">
-            <a:extLst>
-              <a:ext uri="{FF2B5EF4-FFF2-40B4-BE49-F238E27FC236}">
-                <a16:creationId xmlns:a16="http://schemas.microsoft.com/office/drawing/2014/main" id="{A759F477-EBA7-30B2-58D8-A5BFE2BA9AF8}"/>
-              </a:ext>
-            </a:extLst>
-          </p:cNvPr>
-          <p:cNvSpPr/>
-          <p:nvPr/>
-        </p:nvSpPr>
-        <p:spPr>
-          <a:xfrm>
-            <a:off x="3447171" y="1838390"/>
-            <a:ext cx="2870200" cy="3087452"/>
-          </a:xfrm>
-          <a:prstGeom prst="roundRect">
-            <a:avLst/>
-          </a:prstGeom>
-          <a:solidFill>
-            <a:schemeClr val="accent4">
-              <a:lumMod val="20000"/>
-              <a:lumOff val="80000"/>
-              <a:alpha val="50000"/>
-            </a:schemeClr>
-          </a:solidFill>
-          <a:ln>
-            <a:noFill/>
-          </a:ln>
-        </p:spPr>
-        <p:style>
-          <a:lnRef idx="0">
-            <a:scrgbClr r="0" g="0" b="0"/>
-          </a:lnRef>
-          <a:fillRef idx="0">
-            <a:scrgbClr r="0" g="0" b="0"/>
-          </a:fillRef>
-          <a:effectRef idx="0">
-            <a:scrgbClr r="0" g="0" b="0"/>
-          </a:effectRef>
-          <a:fontRef idx="minor">
-            <a:schemeClr val="lt1"/>
-          </a:fontRef>
-        </p:style>
-        <p:txBody>
-          <a:bodyPr rtlCol="0" anchor="ctr"/>
-          <a:lstStyle/>
-          <a:p>
-            <a:pPr algn="ctr"/>
-            <a:endParaRPr lang="LID4096" dirty="0">
-              <a:solidFill>
-                <a:schemeClr val="bg1"/>
-              </a:solidFill>
-            </a:endParaRPr>
-          </a:p>
-        </p:txBody>
-      </p:sp>
-      <p:sp>
-        <p:nvSpPr>
-          <p:cNvPr id="21" name="Rectangle: Rounded Corners 20">
-            <a:extLst>
-              <a:ext uri="{FF2B5EF4-FFF2-40B4-BE49-F238E27FC236}">
-                <a16:creationId xmlns:a16="http://schemas.microsoft.com/office/drawing/2014/main" id="{6093CC7E-63A8-8B6D-5D57-B9B2ADB36153}"/>
-              </a:ext>
-            </a:extLst>
-          </p:cNvPr>
-          <p:cNvSpPr/>
-          <p:nvPr/>
-        </p:nvSpPr>
-        <p:spPr>
-          <a:xfrm>
-            <a:off x="6364563" y="1847797"/>
-            <a:ext cx="2773416" cy="3181226"/>
-          </a:xfrm>
-          <a:prstGeom prst="roundRect">
-            <a:avLst/>
-          </a:prstGeom>
-          <a:solidFill>
-            <a:schemeClr val="accent4">
-              <a:lumMod val="20000"/>
-              <a:lumOff val="80000"/>
-              <a:alpha val="50000"/>
-            </a:schemeClr>
-          </a:solidFill>
-          <a:ln>
-            <a:noFill/>
-          </a:ln>
-        </p:spPr>
-        <p:style>
-          <a:lnRef idx="0">
-            <a:scrgbClr r="0" g="0" b="0"/>
-          </a:lnRef>
-          <a:fillRef idx="0">
-            <a:scrgbClr r="0" g="0" b="0"/>
-          </a:fillRef>
-          <a:effectRef idx="0">
-            <a:scrgbClr r="0" g="0" b="0"/>
-          </a:effectRef>
-          <a:fontRef idx="minor">
-            <a:schemeClr val="lt1"/>
-          </a:fontRef>
-        </p:style>
-        <p:txBody>
-          <a:bodyPr rtlCol="0" anchor="ctr"/>
-          <a:lstStyle/>
-          <a:p>
-            <a:pPr algn="ctr"/>
-            <a:endParaRPr lang="LID4096" dirty="0">
-              <a:solidFill>
-                <a:schemeClr val="bg1"/>
-              </a:solidFill>
-            </a:endParaRPr>
-          </a:p>
-        </p:txBody>
-      </p:sp>
-      <p:sp>
-        <p:nvSpPr>
-          <p:cNvPr id="22" name="Rectangle: Rounded Corners 21">
-            <a:extLst>
-              <a:ext uri="{FF2B5EF4-FFF2-40B4-BE49-F238E27FC236}">
-                <a16:creationId xmlns:a16="http://schemas.microsoft.com/office/drawing/2014/main" id="{711F8861-AEB3-CF11-67F8-916D6759DD7C}"/>
-              </a:ext>
-            </a:extLst>
-          </p:cNvPr>
-          <p:cNvSpPr/>
-          <p:nvPr/>
-        </p:nvSpPr>
-        <p:spPr>
-          <a:xfrm>
-            <a:off x="9180565" y="1838390"/>
-            <a:ext cx="2773416" cy="3181227"/>
-          </a:xfrm>
-          <a:prstGeom prst="roundRect">
-            <a:avLst/>
-          </a:prstGeom>
-          <a:solidFill>
-            <a:schemeClr val="accent4">
-              <a:lumMod val="20000"/>
-              <a:lumOff val="80000"/>
-              <a:alpha val="50000"/>
-            </a:schemeClr>
-          </a:solidFill>
-          <a:ln>
-            <a:noFill/>
-          </a:ln>
-        </p:spPr>
-        <p:style>
-          <a:lnRef idx="0">
-            <a:scrgbClr r="0" g="0" b="0"/>
-          </a:lnRef>
-          <a:fillRef idx="0">
-            <a:scrgbClr r="0" g="0" b="0"/>
-          </a:fillRef>
-          <a:effectRef idx="0">
-            <a:scrgbClr r="0" g="0" b="0"/>
-          </a:effectRef>
-          <a:fontRef idx="minor">
-            <a:schemeClr val="lt1"/>
-          </a:fontRef>
-        </p:style>
-        <p:txBody>
-          <a:bodyPr rtlCol="0" anchor="ctr"/>
-          <a:lstStyle/>
-          <a:p>
-            <a:pPr algn="ctr"/>
-            <a:endParaRPr lang="LID4096" dirty="0">
-              <a:solidFill>
-                <a:schemeClr val="bg1"/>
-              </a:solidFill>
-            </a:endParaRPr>
-          </a:p>
-        </p:txBody>
-      </p:sp>
-      <p:sp>
-        <p:nvSpPr>
-          <p:cNvPr id="17" name="Rectangle: Rounded Corners 16">
-            <a:extLst>
-              <a:ext uri="{FF2B5EF4-FFF2-40B4-BE49-F238E27FC236}">
-                <a16:creationId xmlns:a16="http://schemas.microsoft.com/office/drawing/2014/main" id="{F59A76EB-7DD6-8EA9-AD30-413B3C112975}"/>
-              </a:ext>
-            </a:extLst>
-          </p:cNvPr>
-          <p:cNvSpPr/>
-          <p:nvPr/>
-        </p:nvSpPr>
-        <p:spPr>
-          <a:xfrm>
-            <a:off x="635000" y="5329301"/>
-            <a:ext cx="11175923" cy="1385728"/>
-          </a:xfrm>
-          <a:prstGeom prst="roundRect">
-            <a:avLst/>
-          </a:prstGeom>
-          <a:solidFill>
-            <a:schemeClr val="accent2">
-              <a:lumMod val="60000"/>
-              <a:lumOff val="40000"/>
-              <a:alpha val="50000"/>
-            </a:schemeClr>
-          </a:solidFill>
-          <a:ln>
-            <a:noFill/>
-          </a:ln>
-        </p:spPr>
-        <p:style>
-          <a:lnRef idx="0">
-            <a:scrgbClr r="0" g="0" b="0"/>
-          </a:lnRef>
-          <a:fillRef idx="0">
-            <a:scrgbClr r="0" g="0" b="0"/>
-          </a:fillRef>
-          <a:effectRef idx="0">
-            <a:scrgbClr r="0" g="0" b="0"/>
-          </a:effectRef>
-          <a:fontRef idx="minor">
-            <a:schemeClr val="lt1"/>
-          </a:fontRef>
-        </p:style>
-        <p:txBody>
-          <a:bodyPr rtlCol="0" anchor="ctr"/>
-          <a:lstStyle/>
-          <a:p>
-            <a:pPr algn="ctr"/>
-            <a:endParaRPr lang="LID4096" dirty="0">
-              <a:solidFill>
-                <a:schemeClr val="bg1"/>
-              </a:solidFill>
-            </a:endParaRPr>
-          </a:p>
-        </p:txBody>
-      </p:sp>
-      <p:sp>
-        <p:nvSpPr>
-          <p:cNvPr id="2" name="Title 1">
-            <a:extLst>
-              <a:ext uri="{FF2B5EF4-FFF2-40B4-BE49-F238E27FC236}">
-                <a16:creationId xmlns:a16="http://schemas.microsoft.com/office/drawing/2014/main" id="{6AEA4D1F-AD2B-840A-69FE-C979D68A8EF3}"/>
-              </a:ext>
-            </a:extLst>
-          </p:cNvPr>
-          <p:cNvSpPr>
-            <a:spLocks noGrp="1"/>
-          </p:cNvSpPr>
-          <p:nvPr>
-            <p:ph type="title"/>
-          </p:nvPr>
-        </p:nvSpPr>
-        <p:spPr/>
-        <p:txBody>
-          <a:bodyPr/>
-          <a:lstStyle/>
-          <a:p>
-            <a:r>
-              <a:rPr lang="en-GB" dirty="0" err="1">
-                <a:latin typeface="Arial Rounded MT Bold" panose="020F0704030504030204" pitchFamily="34" charset="0"/>
-              </a:rPr>
-              <a:t>FreeRTOS</a:t>
-            </a:r>
-            <a:r>
-              <a:rPr lang="en-GB" dirty="0">
-                <a:latin typeface="Arial Rounded MT Bold" panose="020F0704030504030204" pitchFamily="34" charset="0"/>
-              </a:rPr>
-              <a:t> on Arduino</a:t>
-            </a:r>
-            <a:endParaRPr lang="LID4096" dirty="0">
-              <a:latin typeface="Arial Rounded MT Bold" panose="020F0704030504030204" pitchFamily="34" charset="0"/>
-            </a:endParaRPr>
-          </a:p>
-        </p:txBody>
-      </p:sp>
-      <p:sp>
-        <p:nvSpPr>
-          <p:cNvPr id="4" name="Rectangle: Rounded Corners 3">
-            <a:extLst>
-              <a:ext uri="{FF2B5EF4-FFF2-40B4-BE49-F238E27FC236}">
-                <a16:creationId xmlns:a16="http://schemas.microsoft.com/office/drawing/2014/main" id="{4E322B22-432B-8BD2-C4E4-75A405F96E51}"/>
-              </a:ext>
-            </a:extLst>
-          </p:cNvPr>
-          <p:cNvSpPr/>
-          <p:nvPr/>
-        </p:nvSpPr>
-        <p:spPr>
-          <a:xfrm>
-            <a:off x="741768" y="2217178"/>
-            <a:ext cx="2201023" cy="314071"/>
-          </a:xfrm>
-          <a:prstGeom prst="roundRect">
-            <a:avLst/>
-          </a:prstGeom>
-          <a:solidFill>
-            <a:schemeClr val="dk1">
-              <a:alpha val="50000"/>
-            </a:schemeClr>
-          </a:solidFill>
-          <a:ln>
-            <a:noFill/>
-          </a:ln>
-        </p:spPr>
-        <p:style>
-          <a:lnRef idx="0">
-            <a:scrgbClr r="0" g="0" b="0"/>
-          </a:lnRef>
-          <a:fillRef idx="0">
-            <a:scrgbClr r="0" g="0" b="0"/>
-          </a:fillRef>
-          <a:effectRef idx="0">
-            <a:scrgbClr r="0" g="0" b="0"/>
-          </a:effectRef>
-          <a:fontRef idx="minor">
-            <a:schemeClr val="lt1"/>
-          </a:fontRef>
-        </p:style>
-        <p:txBody>
-          <a:bodyPr rtlCol="0" anchor="ctr"/>
-          <a:lstStyle/>
-          <a:p>
-            <a:pPr algn="ctr"/>
-            <a:endParaRPr lang="LID4096" dirty="0">
-              <a:solidFill>
-                <a:schemeClr val="bg1"/>
-              </a:solidFill>
-            </a:endParaRPr>
-          </a:p>
-        </p:txBody>
-      </p:sp>
-      <p:sp>
-        <p:nvSpPr>
-          <p:cNvPr id="5" name="Rectangle: Rounded Corners 4">
-            <a:extLst>
-              <a:ext uri="{FF2B5EF4-FFF2-40B4-BE49-F238E27FC236}">
-                <a16:creationId xmlns:a16="http://schemas.microsoft.com/office/drawing/2014/main" id="{893397AA-D8E4-F7A5-8628-510659789AEE}"/>
-              </a:ext>
-            </a:extLst>
-          </p:cNvPr>
-          <p:cNvSpPr/>
-          <p:nvPr/>
-        </p:nvSpPr>
-        <p:spPr>
-          <a:xfrm>
-            <a:off x="688227" y="2162170"/>
-            <a:ext cx="2201023" cy="314071"/>
-          </a:xfrm>
-          <a:prstGeom prst="roundRect">
-            <a:avLst/>
-          </a:prstGeom>
-          <a:solidFill>
-            <a:schemeClr val="accent2"/>
-          </a:solidFill>
           <a:ln>
             <a:noFill/>
           </a:ln>
@@ -4121,6 +3760,811 @@
           <a:lstStyle/>
           <a:p>
             <a:pPr algn="ctr"/>
+            <a:endParaRPr lang="en-US"/>
+          </a:p>
+        </p:txBody>
+      </p:sp>
+      <p:sp useBgFill="1">
+        <p:nvSpPr>
+          <p:cNvPr id="25" name="Rectangle 24">
+            <a:extLst>
+              <a:ext uri="{FF2B5EF4-FFF2-40B4-BE49-F238E27FC236}">
+                <a16:creationId xmlns:a16="http://schemas.microsoft.com/office/drawing/2014/main" id="{0ADDB668-2CA4-4D2B-9C34-3487CA330BA8}"/>
+              </a:ext>
+              <a:ext uri="{C183D7F6-B498-43B3-948B-1728B52AA6E4}">
+                <adec:decorative xmlns:adec="http://schemas.microsoft.com/office/drawing/2017/decorative" val="1"/>
+              </a:ext>
+            </a:extLst>
+          </p:cNvPr>
+          <p:cNvSpPr>
+            <a:spLocks noGrp="1" noRot="1" noChangeAspect="1" noMove="1" noResize="1" noEditPoints="1" noAdjustHandles="1" noChangeArrowheads="1" noChangeShapeType="1" noTextEdit="1"/>
+          </p:cNvSpPr>
+          <p:nvPr>
+            <p:extLst>
+              <p:ext uri="{386F3935-93C4-4BCD-93E2-E3B085C9AB24}">
+                <p16:designElem xmlns:p16="http://schemas.microsoft.com/office/powerpoint/2015/main" val="1"/>
+              </p:ext>
+            </p:extLst>
+          </p:nvPr>
+        </p:nvSpPr>
+        <p:spPr>
+          <a:xfrm>
+            <a:off x="551553" y="304802"/>
+            <a:ext cx="11097349" cy="1573149"/>
+          </a:xfrm>
+          <a:prstGeom prst="rect">
+            <a:avLst/>
+          </a:prstGeom>
+          <a:ln w="12700">
+            <a:solidFill>
+              <a:srgbClr val="DEDEDE"/>
+            </a:solidFill>
+          </a:ln>
+          <a:effectLst>
+            <a:outerShdw blurRad="50800" dist="38100" dir="2700000" algn="tl" rotWithShape="0">
+              <a:schemeClr val="bg2">
+                <a:lumMod val="85000"/>
+                <a:alpha val="50000"/>
+              </a:schemeClr>
+            </a:outerShdw>
+          </a:effectLst>
+        </p:spPr>
+        <p:style>
+          <a:lnRef idx="2">
+            <a:schemeClr val="accent1">
+              <a:shade val="50000"/>
+            </a:schemeClr>
+          </a:lnRef>
+          <a:fillRef idx="1">
+            <a:schemeClr val="accent1"/>
+          </a:fillRef>
+          <a:effectRef idx="0">
+            <a:schemeClr val="accent1"/>
+          </a:effectRef>
+          <a:fontRef idx="minor">
+            <a:schemeClr val="lt1"/>
+          </a:fontRef>
+        </p:style>
+        <p:txBody>
+          <a:bodyPr rtlCol="0" anchor="ctr"/>
+          <a:lstStyle/>
+          <a:p>
+            <a:pPr marL="0" marR="0" lvl="0" indent="0" algn="ctr" defTabSz="914400" rtl="0" eaLnBrk="1" fontAlgn="auto" latinLnBrk="0" hangingPunct="1">
+              <a:lnSpc>
+                <a:spcPct val="100000"/>
+              </a:lnSpc>
+              <a:spcBef>
+                <a:spcPts val="0"/>
+              </a:spcBef>
+              <a:spcAft>
+                <a:spcPts val="0"/>
+              </a:spcAft>
+              <a:buClrTx/>
+              <a:buSzTx/>
+              <a:buFontTx/>
+              <a:buNone/>
+              <a:tabLst/>
+              <a:defRPr/>
+            </a:pPr>
+            <a:endParaRPr kumimoji="0" lang="en-US" sz="1800" b="0" i="0" u="none" strike="noStrike" kern="1200" cap="none" spc="0" normalizeH="0" baseline="0" noProof="0">
+              <a:ln>
+                <a:noFill/>
+              </a:ln>
+              <a:solidFill>
+                <a:prstClr val="white"/>
+              </a:solidFill>
+              <a:effectLst/>
+              <a:uLnTx/>
+              <a:uFillTx/>
+              <a:latin typeface="Calibri" panose="020F0502020204030204"/>
+              <a:ea typeface="+mn-ea"/>
+              <a:cs typeface="+mn-cs"/>
+            </a:endParaRPr>
+          </a:p>
+        </p:txBody>
+      </p:sp>
+      <p:sp>
+        <p:nvSpPr>
+          <p:cNvPr id="2" name="Title 1">
+            <a:extLst>
+              <a:ext uri="{FF2B5EF4-FFF2-40B4-BE49-F238E27FC236}">
+                <a16:creationId xmlns:a16="http://schemas.microsoft.com/office/drawing/2014/main" id="{9AD481CF-C894-AB59-F5F3-CBE2D7C81A09}"/>
+              </a:ext>
+            </a:extLst>
+          </p:cNvPr>
+          <p:cNvSpPr>
+            <a:spLocks noGrp="1"/>
+          </p:cNvSpPr>
+          <p:nvPr>
+            <p:ph type="title"/>
+          </p:nvPr>
+        </p:nvSpPr>
+        <p:spPr>
+          <a:xfrm>
+            <a:off x="901690" y="405575"/>
+            <a:ext cx="10617210" cy="1371600"/>
+          </a:xfrm>
+        </p:spPr>
+        <p:txBody>
+          <a:bodyPr vert="horz" lIns="91440" tIns="45720" rIns="91440" bIns="45720" rtlCol="0" anchor="ctr">
+            <a:normAutofit/>
+          </a:bodyPr>
+          <a:lstStyle/>
+          <a:p>
+            <a:r>
+              <a:rPr lang="en-US" sz="4000" kern="1200" dirty="0">
+                <a:solidFill>
+                  <a:schemeClr val="tx1"/>
+                </a:solidFill>
+                <a:latin typeface="Arial Rounded MT Bold" panose="020F0704030504030204" pitchFamily="34" charset="0"/>
+              </a:rPr>
+              <a:t>VHDL							Simulation</a:t>
+            </a:r>
+          </a:p>
+        </p:txBody>
+      </p:sp>
+      <p:sp>
+        <p:nvSpPr>
+          <p:cNvPr id="27" name="Rectangle 26">
+            <a:extLst>
+              <a:ext uri="{FF2B5EF4-FFF2-40B4-BE49-F238E27FC236}">
+                <a16:creationId xmlns:a16="http://schemas.microsoft.com/office/drawing/2014/main" id="{2568BC19-F052-4108-93E1-6A3D1DEC072F}"/>
+              </a:ext>
+              <a:ext uri="{C183D7F6-B498-43B3-948B-1728B52AA6E4}">
+                <adec:decorative xmlns:adec="http://schemas.microsoft.com/office/drawing/2017/decorative" val="1"/>
+              </a:ext>
+            </a:extLst>
+          </p:cNvPr>
+          <p:cNvSpPr>
+            <a:spLocks noGrp="1" noRot="1" noChangeAspect="1" noMove="1" noResize="1" noEditPoints="1" noAdjustHandles="1" noChangeArrowheads="1" noChangeShapeType="1" noTextEdit="1"/>
+          </p:cNvSpPr>
+          <p:nvPr>
+            <p:extLst>
+              <p:ext uri="{386F3935-93C4-4BCD-93E2-E3B085C9AB24}">
+                <p16:designElem xmlns:p16="http://schemas.microsoft.com/office/powerpoint/2015/main" val="1"/>
+              </p:ext>
+            </p:extLst>
+          </p:nvPr>
+        </p:nvSpPr>
+        <p:spPr>
+          <a:xfrm>
+            <a:off x="494784" y="764424"/>
+            <a:ext cx="128016" cy="653903"/>
+          </a:xfrm>
+          <a:prstGeom prst="rect">
+            <a:avLst/>
+          </a:prstGeom>
+          <a:solidFill>
+            <a:schemeClr val="accent2"/>
+          </a:solidFill>
+          <a:ln>
+            <a:noFill/>
+          </a:ln>
+        </p:spPr>
+        <p:style>
+          <a:lnRef idx="2">
+            <a:schemeClr val="accent1">
+              <a:shade val="50000"/>
+            </a:schemeClr>
+          </a:lnRef>
+          <a:fillRef idx="1">
+            <a:schemeClr val="accent1"/>
+          </a:fillRef>
+          <a:effectRef idx="0">
+            <a:schemeClr val="accent1"/>
+          </a:effectRef>
+          <a:fontRef idx="minor">
+            <a:schemeClr val="lt1"/>
+          </a:fontRef>
+        </p:style>
+        <p:txBody>
+          <a:bodyPr rtlCol="0" anchor="ctr"/>
+          <a:lstStyle/>
+          <a:p>
+            <a:pPr algn="ctr"/>
+            <a:endParaRPr lang="en-US">
+              <a:solidFill>
+                <a:prstClr val="white"/>
+              </a:solidFill>
+              <a:latin typeface="Calibri" panose="020F0502020204030204"/>
+            </a:endParaRPr>
+          </a:p>
+        </p:txBody>
+      </p:sp>
+      <p:sp>
+        <p:nvSpPr>
+          <p:cNvPr id="29" name="Rectangle 28">
+            <a:extLst>
+              <a:ext uri="{FF2B5EF4-FFF2-40B4-BE49-F238E27FC236}">
+                <a16:creationId xmlns:a16="http://schemas.microsoft.com/office/drawing/2014/main" id="{D5FD337D-4D6B-4C8B-B6F5-121097E09881}"/>
+              </a:ext>
+              <a:ext uri="{C183D7F6-B498-43B3-948B-1728B52AA6E4}">
+                <adec:decorative xmlns:adec="http://schemas.microsoft.com/office/drawing/2017/decorative" val="1"/>
+              </a:ext>
+            </a:extLst>
+          </p:cNvPr>
+          <p:cNvSpPr>
+            <a:spLocks noGrp="1" noRot="1" noChangeAspect="1" noMove="1" noResize="1" noEditPoints="1" noAdjustHandles="1" noChangeArrowheads="1" noChangeShapeType="1" noTextEdit="1"/>
+          </p:cNvSpPr>
+          <p:nvPr>
+            <p:extLst>
+              <p:ext uri="{386F3935-93C4-4BCD-93E2-E3B085C9AB24}">
+                <p16:designElem xmlns:p16="http://schemas.microsoft.com/office/powerpoint/2015/main" val="1"/>
+              </p:ext>
+            </p:extLst>
+          </p:nvPr>
+        </p:nvSpPr>
+        <p:spPr>
+          <a:xfrm rot="5400000">
+            <a:off x="7126032" y="1067264"/>
+            <a:ext cx="1021458" cy="18288"/>
+          </a:xfrm>
+          <a:prstGeom prst="rect">
+            <a:avLst/>
+          </a:prstGeom>
+          <a:solidFill>
+            <a:srgbClr val="D5D5D5"/>
+          </a:solidFill>
+          <a:ln w="3175">
+            <a:noFill/>
+          </a:ln>
+          <a:effectLst/>
+        </p:spPr>
+        <p:style>
+          <a:lnRef idx="2">
+            <a:schemeClr val="accent1">
+              <a:shade val="50000"/>
+            </a:schemeClr>
+          </a:lnRef>
+          <a:fillRef idx="1">
+            <a:schemeClr val="accent1"/>
+          </a:fillRef>
+          <a:effectRef idx="0">
+            <a:schemeClr val="accent1"/>
+          </a:effectRef>
+          <a:fontRef idx="minor">
+            <a:schemeClr val="lt1"/>
+          </a:fontRef>
+        </p:style>
+        <p:txBody>
+          <a:bodyPr rtlCol="0" anchor="ctr"/>
+          <a:lstStyle/>
+          <a:p>
+            <a:pPr algn="ctr"/>
+            <a:endParaRPr lang="en-US">
+              <a:solidFill>
+                <a:prstClr val="white"/>
+              </a:solidFill>
+              <a:latin typeface="Calibri" panose="020F0502020204030204"/>
+            </a:endParaRPr>
+          </a:p>
+        </p:txBody>
+      </p:sp>
+    </p:spTree>
+    <p:extLst>
+      <p:ext uri="{BB962C8B-B14F-4D97-AF65-F5344CB8AC3E}">
+        <p14:creationId xmlns:p14="http://schemas.microsoft.com/office/powerpoint/2010/main" val="4044943662"/>
+      </p:ext>
+    </p:extLst>
+  </p:cSld>
+  <p:clrMapOvr>
+    <a:masterClrMapping/>
+  </p:clrMapOvr>
+</p:sld>
+</file>
+
+<file path=ppt/slides/slide11.xml><?xml version="1.0" encoding="utf-8"?>
+<p:sld xmlns:a="http://schemas.openxmlformats.org/drawingml/2006/main" xmlns:r="http://schemas.openxmlformats.org/officeDocument/2006/relationships" xmlns:p="http://schemas.openxmlformats.org/presentationml/2006/main">
+  <p:cSld>
+    <p:spTree>
+      <p:nvGrpSpPr>
+        <p:cNvPr id="1" name=""/>
+        <p:cNvGrpSpPr/>
+        <p:nvPr/>
+      </p:nvGrpSpPr>
+      <p:grpSpPr>
+        <a:xfrm>
+          <a:off x="0" y="0"/>
+          <a:ext cx="0" cy="0"/>
+          <a:chOff x="0" y="0"/>
+          <a:chExt cx="0" cy="0"/>
+        </a:xfrm>
+      </p:grpSpPr>
+      <p:sp>
+        <p:nvSpPr>
+          <p:cNvPr id="2" name="Title 1">
+            <a:extLst>
+              <a:ext uri="{FF2B5EF4-FFF2-40B4-BE49-F238E27FC236}">
+                <a16:creationId xmlns:a16="http://schemas.microsoft.com/office/drawing/2014/main" id="{6420E36B-836F-D9C0-DE96-1C98126FB24D}"/>
+              </a:ext>
+            </a:extLst>
+          </p:cNvPr>
+          <p:cNvSpPr>
+            <a:spLocks noGrp="1"/>
+          </p:cNvSpPr>
+          <p:nvPr>
+            <p:ph type="title"/>
+          </p:nvPr>
+        </p:nvSpPr>
+        <p:spPr>
+          <a:xfrm>
+            <a:off x="1524000" y="2915901"/>
+            <a:ext cx="9144000" cy="1026197"/>
+          </a:xfrm>
+        </p:spPr>
+        <p:txBody>
+          <a:bodyPr vert="horz" lIns="91440" tIns="45720" rIns="91440" bIns="45720" rtlCol="0" anchor="b">
+            <a:normAutofit/>
+          </a:bodyPr>
+          <a:lstStyle/>
+          <a:p>
+            <a:pPr algn="ctr"/>
+            <a:r>
+              <a:rPr lang="en-US" sz="6600" b="1" dirty="0">
+                <a:latin typeface="Arial Rounded MT Bold" panose="020F0704030504030204" pitchFamily="34" charset="0"/>
+              </a:rPr>
+              <a:t>The Prototype </a:t>
+            </a:r>
+          </a:p>
+        </p:txBody>
+      </p:sp>
+    </p:spTree>
+    <p:extLst>
+      <p:ext uri="{BB962C8B-B14F-4D97-AF65-F5344CB8AC3E}">
+        <p14:creationId xmlns:p14="http://schemas.microsoft.com/office/powerpoint/2010/main" val="4138361576"/>
+      </p:ext>
+    </p:extLst>
+  </p:cSld>
+  <p:clrMapOvr>
+    <a:masterClrMapping/>
+  </p:clrMapOvr>
+</p:sld>
+</file>
+
+<file path=ppt/slides/slide12.xml><?xml version="1.0" encoding="utf-8"?>
+<p:sld xmlns:a="http://schemas.openxmlformats.org/drawingml/2006/main" xmlns:r="http://schemas.openxmlformats.org/officeDocument/2006/relationships" xmlns:p="http://schemas.openxmlformats.org/presentationml/2006/main">
+  <p:cSld>
+    <p:spTree>
+      <p:nvGrpSpPr>
+        <p:cNvPr id="1" name=""/>
+        <p:cNvGrpSpPr/>
+        <p:nvPr/>
+      </p:nvGrpSpPr>
+      <p:grpSpPr>
+        <a:xfrm>
+          <a:off x="0" y="0"/>
+          <a:ext cx="0" cy="0"/>
+          <a:chOff x="0" y="0"/>
+          <a:chExt cx="0" cy="0"/>
+        </a:xfrm>
+      </p:grpSpPr>
+      <p:sp>
+        <p:nvSpPr>
+          <p:cNvPr id="19" name="Rectangle: Rounded Corners 18">
+            <a:extLst>
+              <a:ext uri="{FF2B5EF4-FFF2-40B4-BE49-F238E27FC236}">
+                <a16:creationId xmlns:a16="http://schemas.microsoft.com/office/drawing/2014/main" id="{FE88D303-E063-4235-EBBC-82AACEAED374}"/>
+              </a:ext>
+            </a:extLst>
+          </p:cNvPr>
+          <p:cNvSpPr/>
+          <p:nvPr/>
+        </p:nvSpPr>
+        <p:spPr>
+          <a:xfrm>
+            <a:off x="502418" y="1893990"/>
+            <a:ext cx="1764876" cy="3125627"/>
+          </a:xfrm>
+          <a:prstGeom prst="roundRect">
+            <a:avLst/>
+          </a:prstGeom>
+          <a:solidFill>
+            <a:schemeClr val="accent4">
+              <a:lumMod val="40000"/>
+              <a:lumOff val="60000"/>
+              <a:alpha val="50000"/>
+            </a:schemeClr>
+          </a:solidFill>
+          <a:ln>
+            <a:noFill/>
+          </a:ln>
+        </p:spPr>
+        <p:style>
+          <a:lnRef idx="0">
+            <a:scrgbClr r="0" g="0" b="0"/>
+          </a:lnRef>
+          <a:fillRef idx="0">
+            <a:scrgbClr r="0" g="0" b="0"/>
+          </a:fillRef>
+          <a:effectRef idx="0">
+            <a:scrgbClr r="0" g="0" b="0"/>
+          </a:effectRef>
+          <a:fontRef idx="minor">
+            <a:schemeClr val="lt1"/>
+          </a:fontRef>
+        </p:style>
+        <p:txBody>
+          <a:bodyPr rtlCol="0" anchor="ctr"/>
+          <a:lstStyle/>
+          <a:p>
+            <a:pPr algn="ctr"/>
+            <a:endParaRPr lang="LID4096" dirty="0">
+              <a:solidFill>
+                <a:schemeClr val="bg1"/>
+              </a:solidFill>
+            </a:endParaRPr>
+          </a:p>
+        </p:txBody>
+      </p:sp>
+      <p:sp>
+        <p:nvSpPr>
+          <p:cNvPr id="20" name="Rectangle: Rounded Corners 19">
+            <a:extLst>
+              <a:ext uri="{FF2B5EF4-FFF2-40B4-BE49-F238E27FC236}">
+                <a16:creationId xmlns:a16="http://schemas.microsoft.com/office/drawing/2014/main" id="{A759F477-EBA7-30B2-58D8-A5BFE2BA9AF8}"/>
+              </a:ext>
+            </a:extLst>
+          </p:cNvPr>
+          <p:cNvSpPr/>
+          <p:nvPr/>
+        </p:nvSpPr>
+        <p:spPr>
+          <a:xfrm>
+            <a:off x="2453103" y="1913077"/>
+            <a:ext cx="1814171" cy="3087452"/>
+          </a:xfrm>
+          <a:prstGeom prst="roundRect">
+            <a:avLst/>
+          </a:prstGeom>
+          <a:solidFill>
+            <a:schemeClr val="accent4">
+              <a:lumMod val="40000"/>
+              <a:lumOff val="60000"/>
+              <a:alpha val="50000"/>
+            </a:schemeClr>
+          </a:solidFill>
+          <a:ln>
+            <a:noFill/>
+          </a:ln>
+        </p:spPr>
+        <p:style>
+          <a:lnRef idx="0">
+            <a:scrgbClr r="0" g="0" b="0"/>
+          </a:lnRef>
+          <a:fillRef idx="0">
+            <a:scrgbClr r="0" g="0" b="0"/>
+          </a:fillRef>
+          <a:effectRef idx="0">
+            <a:scrgbClr r="0" g="0" b="0"/>
+          </a:effectRef>
+          <a:fontRef idx="minor">
+            <a:schemeClr val="lt1"/>
+          </a:fontRef>
+        </p:style>
+        <p:txBody>
+          <a:bodyPr rtlCol="0" anchor="ctr"/>
+          <a:lstStyle/>
+          <a:p>
+            <a:pPr algn="ctr"/>
+            <a:endParaRPr lang="LID4096" dirty="0">
+              <a:solidFill>
+                <a:schemeClr val="bg1"/>
+              </a:solidFill>
+            </a:endParaRPr>
+          </a:p>
+        </p:txBody>
+      </p:sp>
+      <p:sp>
+        <p:nvSpPr>
+          <p:cNvPr id="21" name="Rectangle: Rounded Corners 20">
+            <a:extLst>
+              <a:ext uri="{FF2B5EF4-FFF2-40B4-BE49-F238E27FC236}">
+                <a16:creationId xmlns:a16="http://schemas.microsoft.com/office/drawing/2014/main" id="{6093CC7E-63A8-8B6D-5D57-B9B2ADB36153}"/>
+              </a:ext>
+            </a:extLst>
+          </p:cNvPr>
+          <p:cNvSpPr/>
+          <p:nvPr/>
+        </p:nvSpPr>
+        <p:spPr>
+          <a:xfrm>
+            <a:off x="4464839" y="1893990"/>
+            <a:ext cx="1752997" cy="3181226"/>
+          </a:xfrm>
+          <a:prstGeom prst="roundRect">
+            <a:avLst/>
+          </a:prstGeom>
+          <a:solidFill>
+            <a:schemeClr val="accent4">
+              <a:lumMod val="40000"/>
+              <a:lumOff val="60000"/>
+              <a:alpha val="50000"/>
+            </a:schemeClr>
+          </a:solidFill>
+          <a:ln>
+            <a:noFill/>
+          </a:ln>
+        </p:spPr>
+        <p:style>
+          <a:lnRef idx="0">
+            <a:scrgbClr r="0" g="0" b="0"/>
+          </a:lnRef>
+          <a:fillRef idx="0">
+            <a:scrgbClr r="0" g="0" b="0"/>
+          </a:fillRef>
+          <a:effectRef idx="0">
+            <a:scrgbClr r="0" g="0" b="0"/>
+          </a:effectRef>
+          <a:fontRef idx="minor">
+            <a:schemeClr val="lt1"/>
+          </a:fontRef>
+        </p:style>
+        <p:txBody>
+          <a:bodyPr rtlCol="0" anchor="ctr"/>
+          <a:lstStyle/>
+          <a:p>
+            <a:pPr algn="ctr"/>
+            <a:endParaRPr lang="LID4096" dirty="0">
+              <a:solidFill>
+                <a:schemeClr val="bg1"/>
+              </a:solidFill>
+            </a:endParaRPr>
+          </a:p>
+        </p:txBody>
+      </p:sp>
+      <p:sp>
+        <p:nvSpPr>
+          <p:cNvPr id="22" name="Rectangle: Rounded Corners 21">
+            <a:extLst>
+              <a:ext uri="{FF2B5EF4-FFF2-40B4-BE49-F238E27FC236}">
+                <a16:creationId xmlns:a16="http://schemas.microsoft.com/office/drawing/2014/main" id="{711F8861-AEB3-CF11-67F8-916D6759DD7C}"/>
+              </a:ext>
+            </a:extLst>
+          </p:cNvPr>
+          <p:cNvSpPr/>
+          <p:nvPr/>
+        </p:nvSpPr>
+        <p:spPr>
+          <a:xfrm>
+            <a:off x="6536756" y="1913077"/>
+            <a:ext cx="1752997" cy="3181227"/>
+          </a:xfrm>
+          <a:prstGeom prst="roundRect">
+            <a:avLst/>
+          </a:prstGeom>
+          <a:solidFill>
+            <a:schemeClr val="accent4">
+              <a:lumMod val="40000"/>
+              <a:lumOff val="60000"/>
+              <a:alpha val="50000"/>
+            </a:schemeClr>
+          </a:solidFill>
+          <a:ln>
+            <a:noFill/>
+          </a:ln>
+        </p:spPr>
+        <p:style>
+          <a:lnRef idx="0">
+            <a:scrgbClr r="0" g="0" b="0"/>
+          </a:lnRef>
+          <a:fillRef idx="0">
+            <a:scrgbClr r="0" g="0" b="0"/>
+          </a:fillRef>
+          <a:effectRef idx="0">
+            <a:scrgbClr r="0" g="0" b="0"/>
+          </a:effectRef>
+          <a:fontRef idx="minor">
+            <a:schemeClr val="lt1"/>
+          </a:fontRef>
+        </p:style>
+        <p:txBody>
+          <a:bodyPr rtlCol="0" anchor="ctr"/>
+          <a:lstStyle/>
+          <a:p>
+            <a:pPr algn="ctr"/>
+            <a:endParaRPr lang="LID4096" dirty="0">
+              <a:solidFill>
+                <a:schemeClr val="bg1"/>
+              </a:solidFill>
+            </a:endParaRPr>
+          </a:p>
+        </p:txBody>
+      </p:sp>
+      <p:sp>
+        <p:nvSpPr>
+          <p:cNvPr id="17" name="Rectangle: Rounded Corners 16">
+            <a:extLst>
+              <a:ext uri="{FF2B5EF4-FFF2-40B4-BE49-F238E27FC236}">
+                <a16:creationId xmlns:a16="http://schemas.microsoft.com/office/drawing/2014/main" id="{F59A76EB-7DD6-8EA9-AD30-413B3C112975}"/>
+              </a:ext>
+            </a:extLst>
+          </p:cNvPr>
+          <p:cNvSpPr/>
+          <p:nvPr/>
+        </p:nvSpPr>
+        <p:spPr>
+          <a:xfrm>
+            <a:off x="502418" y="5261711"/>
+            <a:ext cx="7787335" cy="1385728"/>
+          </a:xfrm>
+          <a:prstGeom prst="roundRect">
+            <a:avLst/>
+          </a:prstGeom>
+          <a:solidFill>
+            <a:schemeClr val="accent2">
+              <a:lumMod val="60000"/>
+              <a:lumOff val="40000"/>
+              <a:alpha val="50000"/>
+            </a:schemeClr>
+          </a:solidFill>
+          <a:ln>
+            <a:noFill/>
+          </a:ln>
+        </p:spPr>
+        <p:style>
+          <a:lnRef idx="0">
+            <a:scrgbClr r="0" g="0" b="0"/>
+          </a:lnRef>
+          <a:fillRef idx="0">
+            <a:scrgbClr r="0" g="0" b="0"/>
+          </a:fillRef>
+          <a:effectRef idx="0">
+            <a:scrgbClr r="0" g="0" b="0"/>
+          </a:effectRef>
+          <a:fontRef idx="minor">
+            <a:schemeClr val="lt1"/>
+          </a:fontRef>
+        </p:style>
+        <p:txBody>
+          <a:bodyPr rtlCol="0" anchor="ctr"/>
+          <a:lstStyle/>
+          <a:p>
+            <a:pPr algn="ctr"/>
+            <a:endParaRPr lang="LID4096" dirty="0">
+              <a:solidFill>
+                <a:schemeClr val="bg1"/>
+              </a:solidFill>
+            </a:endParaRPr>
+          </a:p>
+        </p:txBody>
+      </p:sp>
+      <p:sp>
+        <p:nvSpPr>
+          <p:cNvPr id="2" name="Title 1">
+            <a:extLst>
+              <a:ext uri="{FF2B5EF4-FFF2-40B4-BE49-F238E27FC236}">
+                <a16:creationId xmlns:a16="http://schemas.microsoft.com/office/drawing/2014/main" id="{6AEA4D1F-AD2B-840A-69FE-C979D68A8EF3}"/>
+              </a:ext>
+            </a:extLst>
+          </p:cNvPr>
+          <p:cNvSpPr>
+            <a:spLocks noGrp="1"/>
+          </p:cNvSpPr>
+          <p:nvPr>
+            <p:ph type="title"/>
+          </p:nvPr>
+        </p:nvSpPr>
+        <p:spPr/>
+        <p:txBody>
+          <a:bodyPr/>
+          <a:lstStyle/>
+          <a:p>
+            <a:r>
+              <a:rPr lang="en-GB" dirty="0">
+                <a:latin typeface="Arial Rounded MT Bold" panose="020F0704030504030204" pitchFamily="34" charset="0"/>
+              </a:rPr>
+              <a:t>RTOS on Arduino</a:t>
+            </a:r>
+            <a:endParaRPr lang="LID4096" dirty="0">
+              <a:latin typeface="Arial Rounded MT Bold" panose="020F0704030504030204" pitchFamily="34" charset="0"/>
+            </a:endParaRPr>
+          </a:p>
+        </p:txBody>
+      </p:sp>
+      <p:sp>
+        <p:nvSpPr>
+          <p:cNvPr id="4" name="Rectangle: Rounded Corners 3">
+            <a:extLst>
+              <a:ext uri="{FF2B5EF4-FFF2-40B4-BE49-F238E27FC236}">
+                <a16:creationId xmlns:a16="http://schemas.microsoft.com/office/drawing/2014/main" id="{4E322B22-432B-8BD2-C4E4-75A405F96E51}"/>
+              </a:ext>
+            </a:extLst>
+          </p:cNvPr>
+          <p:cNvSpPr/>
+          <p:nvPr/>
+        </p:nvSpPr>
+        <p:spPr>
+          <a:xfrm>
+            <a:off x="741768" y="2217178"/>
+            <a:ext cx="1339356" cy="518071"/>
+          </a:xfrm>
+          <a:prstGeom prst="roundRect">
+            <a:avLst/>
+          </a:prstGeom>
+          <a:solidFill>
+            <a:schemeClr val="dk1">
+              <a:alpha val="50000"/>
+            </a:schemeClr>
+          </a:solidFill>
+          <a:ln>
+            <a:noFill/>
+          </a:ln>
+        </p:spPr>
+        <p:style>
+          <a:lnRef idx="0">
+            <a:scrgbClr r="0" g="0" b="0"/>
+          </a:lnRef>
+          <a:fillRef idx="0">
+            <a:scrgbClr r="0" g="0" b="0"/>
+          </a:fillRef>
+          <a:effectRef idx="0">
+            <a:scrgbClr r="0" g="0" b="0"/>
+          </a:effectRef>
+          <a:fontRef idx="minor">
+            <a:schemeClr val="lt1"/>
+          </a:fontRef>
+        </p:style>
+        <p:txBody>
+          <a:bodyPr rtlCol="0" anchor="ctr"/>
+          <a:lstStyle/>
+          <a:p>
+            <a:pPr algn="ctr"/>
+            <a:endParaRPr lang="LID4096" dirty="0">
+              <a:solidFill>
+                <a:schemeClr val="bg1"/>
+              </a:solidFill>
+            </a:endParaRPr>
+          </a:p>
+        </p:txBody>
+      </p:sp>
+      <p:sp>
+        <p:nvSpPr>
+          <p:cNvPr id="5" name="Rectangle: Rounded Corners 4">
+            <a:extLst>
+              <a:ext uri="{FF2B5EF4-FFF2-40B4-BE49-F238E27FC236}">
+                <a16:creationId xmlns:a16="http://schemas.microsoft.com/office/drawing/2014/main" id="{893397AA-D8E4-F7A5-8628-510659789AEE}"/>
+              </a:ext>
+            </a:extLst>
+          </p:cNvPr>
+          <p:cNvSpPr/>
+          <p:nvPr/>
+        </p:nvSpPr>
+        <p:spPr>
+          <a:xfrm>
+            <a:off x="688227" y="2162170"/>
+            <a:ext cx="1339356" cy="518071"/>
+          </a:xfrm>
+          <a:prstGeom prst="roundRect">
+            <a:avLst/>
+          </a:prstGeom>
+          <a:solidFill>
+            <a:schemeClr val="accent2"/>
+          </a:solidFill>
+          <a:ln>
+            <a:noFill/>
+          </a:ln>
+        </p:spPr>
+        <p:style>
+          <a:lnRef idx="2">
+            <a:schemeClr val="accent1">
+              <a:shade val="50000"/>
+            </a:schemeClr>
+          </a:lnRef>
+          <a:fillRef idx="1">
+            <a:schemeClr val="accent1"/>
+          </a:fillRef>
+          <a:effectRef idx="0">
+            <a:schemeClr val="accent1"/>
+          </a:effectRef>
+          <a:fontRef idx="minor">
+            <a:schemeClr val="lt1"/>
+          </a:fontRef>
+        </p:style>
+        <p:txBody>
+          <a:bodyPr rtlCol="0" anchor="ctr"/>
+          <a:lstStyle/>
+          <a:p>
+            <a:pPr algn="ctr"/>
             <a:r>
               <a:rPr lang="en-GB" sz="1800" dirty="0">
                 <a:solidFill>
@@ -4152,8 +4596,8 @@
         </p:nvSpPr>
         <p:spPr>
           <a:xfrm>
-            <a:off x="3655109" y="2211856"/>
-            <a:ext cx="2516859" cy="314071"/>
+            <a:off x="2650668" y="2286543"/>
+            <a:ext cx="1428159" cy="618157"/>
           </a:xfrm>
           <a:prstGeom prst="roundRect">
             <a:avLst/>
@@ -4208,8 +4652,8 @@
         </p:nvSpPr>
         <p:spPr>
           <a:xfrm>
-            <a:off x="3601568" y="2156848"/>
-            <a:ext cx="2516859" cy="314071"/>
+            <a:off x="2597127" y="2231535"/>
+            <a:ext cx="1428159" cy="618157"/>
           </a:xfrm>
           <a:prstGeom prst="roundRect">
             <a:avLst/>
@@ -4282,7 +4726,7 @@
         </p:nvSpPr>
         <p:spPr>
           <a:xfrm>
-            <a:off x="4047454" y="5788186"/>
+            <a:off x="1614350" y="5827482"/>
             <a:ext cx="1784588" cy="314071"/>
           </a:xfrm>
           <a:prstGeom prst="roundRect">
@@ -4338,7 +4782,7 @@
         </p:nvSpPr>
         <p:spPr>
           <a:xfrm>
-            <a:off x="3993913" y="5743496"/>
+            <a:off x="1560809" y="5782792"/>
             <a:ext cx="1784588" cy="314071"/>
           </a:xfrm>
           <a:prstGeom prst="roundRect">
@@ -4403,7 +4847,7 @@
         </p:nvSpPr>
         <p:spPr>
           <a:xfrm>
-            <a:off x="7683501" y="5763102"/>
+            <a:off x="5508819" y="5824501"/>
             <a:ext cx="1784588" cy="314071"/>
           </a:xfrm>
           <a:prstGeom prst="roundRect">
@@ -4459,7 +4903,7 @@
         </p:nvSpPr>
         <p:spPr>
           <a:xfrm>
-            <a:off x="7629960" y="5708094"/>
+            <a:off x="5455278" y="5769493"/>
             <a:ext cx="1784588" cy="314071"/>
           </a:xfrm>
           <a:prstGeom prst="roundRect">
@@ -4524,8 +4968,8 @@
         </p:nvSpPr>
         <p:spPr>
           <a:xfrm>
-            <a:off x="6540905" y="2211856"/>
-            <a:ext cx="2516859" cy="314071"/>
+            <a:off x="4641181" y="2258049"/>
+            <a:ext cx="1428159" cy="618157"/>
           </a:xfrm>
           <a:prstGeom prst="roundRect">
             <a:avLst/>
@@ -4580,8 +5024,8 @@
         </p:nvSpPr>
         <p:spPr>
           <a:xfrm>
-            <a:off x="6487364" y="2156848"/>
-            <a:ext cx="2516859" cy="314071"/>
+            <a:off x="4587640" y="2203041"/>
+            <a:ext cx="1428159" cy="618157"/>
           </a:xfrm>
           <a:prstGeom prst="roundRect">
             <a:avLst/>
@@ -4654,8 +5098,8 @@
         </p:nvSpPr>
         <p:spPr>
           <a:xfrm>
-            <a:off x="9347605" y="2219739"/>
-            <a:ext cx="2516859" cy="314071"/>
+            <a:off x="6703796" y="2294426"/>
+            <a:ext cx="1428159" cy="618157"/>
           </a:xfrm>
           <a:prstGeom prst="roundRect">
             <a:avLst/>
@@ -4710,8 +5154,8 @@
         </p:nvSpPr>
         <p:spPr>
           <a:xfrm>
-            <a:off x="9294064" y="2164731"/>
-            <a:ext cx="2516859" cy="314071"/>
+            <a:off x="6650255" y="2239418"/>
+            <a:ext cx="1428159" cy="618157"/>
           </a:xfrm>
           <a:prstGeom prst="roundRect">
             <a:avLst/>
@@ -4785,15 +5229,15 @@
         <p:spPr>
           <a:xfrm>
             <a:off x="10297019" y="456999"/>
-            <a:ext cx="1513904" cy="461147"/>
+            <a:ext cx="1423702" cy="461147"/>
           </a:xfrm>
           <a:prstGeom prst="roundRect">
             <a:avLst/>
           </a:prstGeom>
           <a:solidFill>
             <a:schemeClr val="accent4">
-              <a:lumMod val="20000"/>
-              <a:lumOff val="80000"/>
+              <a:lumMod val="40000"/>
+              <a:lumOff val="60000"/>
               <a:alpha val="50000"/>
             </a:schemeClr>
           </a:solidFill>
@@ -4910,6 +5354,1400 @@
     <p:extLst>
       <p:ext uri="{BB962C8B-B14F-4D97-AF65-F5344CB8AC3E}">
         <p14:creationId xmlns:p14="http://schemas.microsoft.com/office/powerpoint/2010/main" val="657479220"/>
+      </p:ext>
+    </p:extLst>
+  </p:cSld>
+  <p:clrMapOvr>
+    <a:masterClrMapping/>
+  </p:clrMapOvr>
+</p:sld>
+</file>
+
+<file path=ppt/slides/slide13.xml><?xml version="1.0" encoding="utf-8"?>
+<p:sld xmlns:a="http://schemas.openxmlformats.org/drawingml/2006/main" xmlns:r="http://schemas.openxmlformats.org/officeDocument/2006/relationships" xmlns:p="http://schemas.openxmlformats.org/presentationml/2006/main">
+  <p:cSld>
+    <p:spTree>
+      <p:nvGrpSpPr>
+        <p:cNvPr id="1" name=""/>
+        <p:cNvGrpSpPr/>
+        <p:nvPr/>
+      </p:nvGrpSpPr>
+      <p:grpSpPr>
+        <a:xfrm>
+          <a:off x="0" y="0"/>
+          <a:ext cx="0" cy="0"/>
+          <a:chOff x="0" y="0"/>
+          <a:chExt cx="0" cy="0"/>
+        </a:xfrm>
+      </p:grpSpPr>
+      <p:sp>
+        <p:nvSpPr>
+          <p:cNvPr id="19" name="Rectangle: Rounded Corners 18">
+            <a:extLst>
+              <a:ext uri="{FF2B5EF4-FFF2-40B4-BE49-F238E27FC236}">
+                <a16:creationId xmlns:a16="http://schemas.microsoft.com/office/drawing/2014/main" id="{FE88D303-E063-4235-EBBC-82AACEAED374}"/>
+              </a:ext>
+            </a:extLst>
+          </p:cNvPr>
+          <p:cNvSpPr/>
+          <p:nvPr/>
+        </p:nvSpPr>
+        <p:spPr>
+          <a:xfrm>
+            <a:off x="502418" y="1893990"/>
+            <a:ext cx="1764876" cy="3125627"/>
+          </a:xfrm>
+          <a:prstGeom prst="roundRect">
+            <a:avLst/>
+          </a:prstGeom>
+          <a:solidFill>
+            <a:schemeClr val="accent4">
+              <a:lumMod val="40000"/>
+              <a:lumOff val="60000"/>
+              <a:alpha val="50000"/>
+            </a:schemeClr>
+          </a:solidFill>
+          <a:ln>
+            <a:noFill/>
+          </a:ln>
+        </p:spPr>
+        <p:style>
+          <a:lnRef idx="0">
+            <a:scrgbClr r="0" g="0" b="0"/>
+          </a:lnRef>
+          <a:fillRef idx="0">
+            <a:scrgbClr r="0" g="0" b="0"/>
+          </a:fillRef>
+          <a:effectRef idx="0">
+            <a:scrgbClr r="0" g="0" b="0"/>
+          </a:effectRef>
+          <a:fontRef idx="minor">
+            <a:schemeClr val="lt1"/>
+          </a:fontRef>
+        </p:style>
+        <p:txBody>
+          <a:bodyPr rtlCol="0" anchor="ctr"/>
+          <a:lstStyle/>
+          <a:p>
+            <a:pPr algn="ctr"/>
+            <a:endParaRPr lang="LID4096" dirty="0">
+              <a:solidFill>
+                <a:schemeClr val="bg1"/>
+              </a:solidFill>
+            </a:endParaRPr>
+          </a:p>
+        </p:txBody>
+      </p:sp>
+      <p:sp>
+        <p:nvSpPr>
+          <p:cNvPr id="20" name="Rectangle: Rounded Corners 19">
+            <a:extLst>
+              <a:ext uri="{FF2B5EF4-FFF2-40B4-BE49-F238E27FC236}">
+                <a16:creationId xmlns:a16="http://schemas.microsoft.com/office/drawing/2014/main" id="{A759F477-EBA7-30B2-58D8-A5BFE2BA9AF8}"/>
+              </a:ext>
+            </a:extLst>
+          </p:cNvPr>
+          <p:cNvSpPr/>
+          <p:nvPr/>
+        </p:nvSpPr>
+        <p:spPr>
+          <a:xfrm>
+            <a:off x="2453103" y="1913077"/>
+            <a:ext cx="1814171" cy="3087452"/>
+          </a:xfrm>
+          <a:prstGeom prst="roundRect">
+            <a:avLst/>
+          </a:prstGeom>
+          <a:solidFill>
+            <a:schemeClr val="accent4">
+              <a:lumMod val="40000"/>
+              <a:lumOff val="60000"/>
+              <a:alpha val="50000"/>
+            </a:schemeClr>
+          </a:solidFill>
+          <a:ln>
+            <a:noFill/>
+          </a:ln>
+        </p:spPr>
+        <p:style>
+          <a:lnRef idx="0">
+            <a:scrgbClr r="0" g="0" b="0"/>
+          </a:lnRef>
+          <a:fillRef idx="0">
+            <a:scrgbClr r="0" g="0" b="0"/>
+          </a:fillRef>
+          <a:effectRef idx="0">
+            <a:scrgbClr r="0" g="0" b="0"/>
+          </a:effectRef>
+          <a:fontRef idx="minor">
+            <a:schemeClr val="lt1"/>
+          </a:fontRef>
+        </p:style>
+        <p:txBody>
+          <a:bodyPr rtlCol="0" anchor="ctr"/>
+          <a:lstStyle/>
+          <a:p>
+            <a:pPr algn="ctr"/>
+            <a:endParaRPr lang="LID4096" dirty="0">
+              <a:solidFill>
+                <a:schemeClr val="bg1"/>
+              </a:solidFill>
+            </a:endParaRPr>
+          </a:p>
+        </p:txBody>
+      </p:sp>
+      <p:sp>
+        <p:nvSpPr>
+          <p:cNvPr id="21" name="Rectangle: Rounded Corners 20">
+            <a:extLst>
+              <a:ext uri="{FF2B5EF4-FFF2-40B4-BE49-F238E27FC236}">
+                <a16:creationId xmlns:a16="http://schemas.microsoft.com/office/drawing/2014/main" id="{6093CC7E-63A8-8B6D-5D57-B9B2ADB36153}"/>
+              </a:ext>
+            </a:extLst>
+          </p:cNvPr>
+          <p:cNvSpPr/>
+          <p:nvPr/>
+        </p:nvSpPr>
+        <p:spPr>
+          <a:xfrm>
+            <a:off x="4464839" y="1893990"/>
+            <a:ext cx="1752997" cy="3181226"/>
+          </a:xfrm>
+          <a:prstGeom prst="roundRect">
+            <a:avLst/>
+          </a:prstGeom>
+          <a:solidFill>
+            <a:schemeClr val="accent4">
+              <a:lumMod val="40000"/>
+              <a:lumOff val="60000"/>
+              <a:alpha val="50000"/>
+            </a:schemeClr>
+          </a:solidFill>
+          <a:ln>
+            <a:noFill/>
+          </a:ln>
+        </p:spPr>
+        <p:style>
+          <a:lnRef idx="0">
+            <a:scrgbClr r="0" g="0" b="0"/>
+          </a:lnRef>
+          <a:fillRef idx="0">
+            <a:scrgbClr r="0" g="0" b="0"/>
+          </a:fillRef>
+          <a:effectRef idx="0">
+            <a:scrgbClr r="0" g="0" b="0"/>
+          </a:effectRef>
+          <a:fontRef idx="minor">
+            <a:schemeClr val="lt1"/>
+          </a:fontRef>
+        </p:style>
+        <p:txBody>
+          <a:bodyPr rtlCol="0" anchor="ctr"/>
+          <a:lstStyle/>
+          <a:p>
+            <a:pPr algn="ctr"/>
+            <a:endParaRPr lang="LID4096" dirty="0">
+              <a:solidFill>
+                <a:schemeClr val="bg1"/>
+              </a:solidFill>
+            </a:endParaRPr>
+          </a:p>
+        </p:txBody>
+      </p:sp>
+      <p:sp>
+        <p:nvSpPr>
+          <p:cNvPr id="22" name="Rectangle: Rounded Corners 21">
+            <a:extLst>
+              <a:ext uri="{FF2B5EF4-FFF2-40B4-BE49-F238E27FC236}">
+                <a16:creationId xmlns:a16="http://schemas.microsoft.com/office/drawing/2014/main" id="{711F8861-AEB3-CF11-67F8-916D6759DD7C}"/>
+              </a:ext>
+            </a:extLst>
+          </p:cNvPr>
+          <p:cNvSpPr/>
+          <p:nvPr/>
+        </p:nvSpPr>
+        <p:spPr>
+          <a:xfrm>
+            <a:off x="6536756" y="1913077"/>
+            <a:ext cx="1752997" cy="3181227"/>
+          </a:xfrm>
+          <a:prstGeom prst="roundRect">
+            <a:avLst/>
+          </a:prstGeom>
+          <a:solidFill>
+            <a:schemeClr val="accent4">
+              <a:lumMod val="40000"/>
+              <a:lumOff val="60000"/>
+              <a:alpha val="50000"/>
+            </a:schemeClr>
+          </a:solidFill>
+          <a:ln>
+            <a:noFill/>
+          </a:ln>
+        </p:spPr>
+        <p:style>
+          <a:lnRef idx="0">
+            <a:scrgbClr r="0" g="0" b="0"/>
+          </a:lnRef>
+          <a:fillRef idx="0">
+            <a:scrgbClr r="0" g="0" b="0"/>
+          </a:fillRef>
+          <a:effectRef idx="0">
+            <a:scrgbClr r="0" g="0" b="0"/>
+          </a:effectRef>
+          <a:fontRef idx="minor">
+            <a:schemeClr val="lt1"/>
+          </a:fontRef>
+        </p:style>
+        <p:txBody>
+          <a:bodyPr rtlCol="0" anchor="ctr"/>
+          <a:lstStyle/>
+          <a:p>
+            <a:pPr algn="ctr"/>
+            <a:endParaRPr lang="LID4096" dirty="0">
+              <a:solidFill>
+                <a:schemeClr val="bg1"/>
+              </a:solidFill>
+            </a:endParaRPr>
+          </a:p>
+        </p:txBody>
+      </p:sp>
+      <p:sp>
+        <p:nvSpPr>
+          <p:cNvPr id="17" name="Rectangle: Rounded Corners 16">
+            <a:extLst>
+              <a:ext uri="{FF2B5EF4-FFF2-40B4-BE49-F238E27FC236}">
+                <a16:creationId xmlns:a16="http://schemas.microsoft.com/office/drawing/2014/main" id="{F59A76EB-7DD6-8EA9-AD30-413B3C112975}"/>
+              </a:ext>
+            </a:extLst>
+          </p:cNvPr>
+          <p:cNvSpPr/>
+          <p:nvPr/>
+        </p:nvSpPr>
+        <p:spPr>
+          <a:xfrm>
+            <a:off x="502418" y="5261711"/>
+            <a:ext cx="9794601" cy="1385728"/>
+          </a:xfrm>
+          <a:prstGeom prst="roundRect">
+            <a:avLst/>
+          </a:prstGeom>
+          <a:solidFill>
+            <a:schemeClr val="accent2">
+              <a:lumMod val="60000"/>
+              <a:lumOff val="40000"/>
+              <a:alpha val="50000"/>
+            </a:schemeClr>
+          </a:solidFill>
+          <a:ln>
+            <a:noFill/>
+          </a:ln>
+        </p:spPr>
+        <p:style>
+          <a:lnRef idx="0">
+            <a:scrgbClr r="0" g="0" b="0"/>
+          </a:lnRef>
+          <a:fillRef idx="0">
+            <a:scrgbClr r="0" g="0" b="0"/>
+          </a:fillRef>
+          <a:effectRef idx="0">
+            <a:scrgbClr r="0" g="0" b="0"/>
+          </a:effectRef>
+          <a:fontRef idx="minor">
+            <a:schemeClr val="lt1"/>
+          </a:fontRef>
+        </p:style>
+        <p:txBody>
+          <a:bodyPr rtlCol="0" anchor="ctr"/>
+          <a:lstStyle/>
+          <a:p>
+            <a:pPr algn="ctr"/>
+            <a:endParaRPr lang="LID4096" dirty="0">
+              <a:solidFill>
+                <a:schemeClr val="bg1"/>
+              </a:solidFill>
+            </a:endParaRPr>
+          </a:p>
+        </p:txBody>
+      </p:sp>
+      <p:sp>
+        <p:nvSpPr>
+          <p:cNvPr id="2" name="Title 1">
+            <a:extLst>
+              <a:ext uri="{FF2B5EF4-FFF2-40B4-BE49-F238E27FC236}">
+                <a16:creationId xmlns:a16="http://schemas.microsoft.com/office/drawing/2014/main" id="{6AEA4D1F-AD2B-840A-69FE-C979D68A8EF3}"/>
+              </a:ext>
+            </a:extLst>
+          </p:cNvPr>
+          <p:cNvSpPr>
+            <a:spLocks noGrp="1"/>
+          </p:cNvSpPr>
+          <p:nvPr>
+            <p:ph type="title"/>
+          </p:nvPr>
+        </p:nvSpPr>
+        <p:spPr/>
+        <p:txBody>
+          <a:bodyPr/>
+          <a:lstStyle/>
+          <a:p>
+            <a:r>
+              <a:rPr lang="en-GB" dirty="0">
+                <a:latin typeface="Arial Rounded MT Bold" panose="020F0704030504030204" pitchFamily="34" charset="0"/>
+              </a:rPr>
+              <a:t>Simulation</a:t>
+            </a:r>
+            <a:endParaRPr lang="LID4096" dirty="0">
+              <a:latin typeface="Arial Rounded MT Bold" panose="020F0704030504030204" pitchFamily="34" charset="0"/>
+            </a:endParaRPr>
+          </a:p>
+        </p:txBody>
+      </p:sp>
+      <p:sp>
+        <p:nvSpPr>
+          <p:cNvPr id="4" name="Rectangle: Rounded Corners 3">
+            <a:extLst>
+              <a:ext uri="{FF2B5EF4-FFF2-40B4-BE49-F238E27FC236}">
+                <a16:creationId xmlns:a16="http://schemas.microsoft.com/office/drawing/2014/main" id="{4E322B22-432B-8BD2-C4E4-75A405F96E51}"/>
+              </a:ext>
+            </a:extLst>
+          </p:cNvPr>
+          <p:cNvSpPr/>
+          <p:nvPr/>
+        </p:nvSpPr>
+        <p:spPr>
+          <a:xfrm>
+            <a:off x="741768" y="2217178"/>
+            <a:ext cx="1339356" cy="518071"/>
+          </a:xfrm>
+          <a:prstGeom prst="roundRect">
+            <a:avLst/>
+          </a:prstGeom>
+          <a:solidFill>
+            <a:schemeClr val="dk1">
+              <a:alpha val="50000"/>
+            </a:schemeClr>
+          </a:solidFill>
+          <a:ln>
+            <a:noFill/>
+          </a:ln>
+        </p:spPr>
+        <p:style>
+          <a:lnRef idx="0">
+            <a:scrgbClr r="0" g="0" b="0"/>
+          </a:lnRef>
+          <a:fillRef idx="0">
+            <a:scrgbClr r="0" g="0" b="0"/>
+          </a:fillRef>
+          <a:effectRef idx="0">
+            <a:scrgbClr r="0" g="0" b="0"/>
+          </a:effectRef>
+          <a:fontRef idx="minor">
+            <a:schemeClr val="lt1"/>
+          </a:fontRef>
+        </p:style>
+        <p:txBody>
+          <a:bodyPr rtlCol="0" anchor="ctr"/>
+          <a:lstStyle/>
+          <a:p>
+            <a:pPr algn="ctr"/>
+            <a:endParaRPr lang="LID4096" dirty="0">
+              <a:solidFill>
+                <a:schemeClr val="bg1"/>
+              </a:solidFill>
+            </a:endParaRPr>
+          </a:p>
+        </p:txBody>
+      </p:sp>
+      <p:sp>
+        <p:nvSpPr>
+          <p:cNvPr id="5" name="Rectangle: Rounded Corners 4">
+            <a:extLst>
+              <a:ext uri="{FF2B5EF4-FFF2-40B4-BE49-F238E27FC236}">
+                <a16:creationId xmlns:a16="http://schemas.microsoft.com/office/drawing/2014/main" id="{893397AA-D8E4-F7A5-8628-510659789AEE}"/>
+              </a:ext>
+            </a:extLst>
+          </p:cNvPr>
+          <p:cNvSpPr/>
+          <p:nvPr/>
+        </p:nvSpPr>
+        <p:spPr>
+          <a:xfrm>
+            <a:off x="688227" y="2162170"/>
+            <a:ext cx="1339356" cy="518071"/>
+          </a:xfrm>
+          <a:prstGeom prst="roundRect">
+            <a:avLst/>
+          </a:prstGeom>
+          <a:solidFill>
+            <a:schemeClr val="accent2"/>
+          </a:solidFill>
+          <a:ln>
+            <a:noFill/>
+          </a:ln>
+        </p:spPr>
+        <p:style>
+          <a:lnRef idx="2">
+            <a:schemeClr val="accent1">
+              <a:shade val="50000"/>
+            </a:schemeClr>
+          </a:lnRef>
+          <a:fillRef idx="1">
+            <a:schemeClr val="accent1"/>
+          </a:fillRef>
+          <a:effectRef idx="0">
+            <a:schemeClr val="accent1"/>
+          </a:effectRef>
+          <a:fontRef idx="minor">
+            <a:schemeClr val="lt1"/>
+          </a:fontRef>
+        </p:style>
+        <p:txBody>
+          <a:bodyPr rtlCol="0" anchor="ctr"/>
+          <a:lstStyle/>
+          <a:p>
+            <a:pPr algn="ctr"/>
+            <a:r>
+              <a:rPr lang="en-GB" sz="1800" dirty="0">
+                <a:solidFill>
+                  <a:schemeClr val="bg1"/>
+                </a:solidFill>
+                <a:latin typeface="Arial Rounded MT Bold" panose="020F0704030504030204" pitchFamily="34" charset="0"/>
+              </a:rPr>
+              <a:t>Request Handler</a:t>
+            </a:r>
+            <a:endParaRPr lang="LID4096" dirty="0">
+              <a:solidFill>
+                <a:schemeClr val="bg1"/>
+              </a:solidFill>
+            </a:endParaRPr>
+          </a:p>
+        </p:txBody>
+      </p:sp>
+      <p:sp>
+        <p:nvSpPr>
+          <p:cNvPr id="6" name="Rectangle: Rounded Corners 5">
+            <a:extLst>
+              <a:ext uri="{FF2B5EF4-FFF2-40B4-BE49-F238E27FC236}">
+                <a16:creationId xmlns:a16="http://schemas.microsoft.com/office/drawing/2014/main" id="{1B387442-9D85-7B6A-076C-07478BB6D6B0}"/>
+              </a:ext>
+            </a:extLst>
+          </p:cNvPr>
+          <p:cNvSpPr/>
+          <p:nvPr/>
+        </p:nvSpPr>
+        <p:spPr>
+          <a:xfrm>
+            <a:off x="2650668" y="2286543"/>
+            <a:ext cx="1428159" cy="618157"/>
+          </a:xfrm>
+          <a:prstGeom prst="roundRect">
+            <a:avLst/>
+          </a:prstGeom>
+          <a:solidFill>
+            <a:schemeClr val="dk1">
+              <a:alpha val="50000"/>
+            </a:schemeClr>
+          </a:solidFill>
+          <a:ln>
+            <a:noFill/>
+          </a:ln>
+        </p:spPr>
+        <p:style>
+          <a:lnRef idx="0">
+            <a:scrgbClr r="0" g="0" b="0"/>
+          </a:lnRef>
+          <a:fillRef idx="0">
+            <a:scrgbClr r="0" g="0" b="0"/>
+          </a:fillRef>
+          <a:effectRef idx="0">
+            <a:scrgbClr r="0" g="0" b="0"/>
+          </a:effectRef>
+          <a:fontRef idx="minor">
+            <a:schemeClr val="lt1"/>
+          </a:fontRef>
+        </p:style>
+        <p:txBody>
+          <a:bodyPr rtlCol="0" anchor="ctr"/>
+          <a:lstStyle/>
+          <a:p>
+            <a:pPr algn="ctr"/>
+            <a:endParaRPr lang="LID4096" dirty="0">
+              <a:solidFill>
+                <a:schemeClr val="bg1"/>
+              </a:solidFill>
+            </a:endParaRPr>
+          </a:p>
+        </p:txBody>
+      </p:sp>
+      <p:sp>
+        <p:nvSpPr>
+          <p:cNvPr id="7" name="Rectangle: Rounded Corners 6">
+            <a:extLst>
+              <a:ext uri="{FF2B5EF4-FFF2-40B4-BE49-F238E27FC236}">
+                <a16:creationId xmlns:a16="http://schemas.microsoft.com/office/drawing/2014/main" id="{DB4619C8-4822-8447-F57B-E38835EC0519}"/>
+              </a:ext>
+            </a:extLst>
+          </p:cNvPr>
+          <p:cNvSpPr/>
+          <p:nvPr/>
+        </p:nvSpPr>
+        <p:spPr>
+          <a:xfrm>
+            <a:off x="2597127" y="2231535"/>
+            <a:ext cx="1428159" cy="618157"/>
+          </a:xfrm>
+          <a:prstGeom prst="roundRect">
+            <a:avLst/>
+          </a:prstGeom>
+          <a:solidFill>
+            <a:schemeClr val="accent2"/>
+          </a:solidFill>
+          <a:ln>
+            <a:noFill/>
+          </a:ln>
+        </p:spPr>
+        <p:style>
+          <a:lnRef idx="2">
+            <a:schemeClr val="accent1">
+              <a:shade val="50000"/>
+            </a:schemeClr>
+          </a:lnRef>
+          <a:fillRef idx="1">
+            <a:schemeClr val="accent1"/>
+          </a:fillRef>
+          <a:effectRef idx="0">
+            <a:schemeClr val="accent1"/>
+          </a:effectRef>
+          <a:fontRef idx="minor">
+            <a:schemeClr val="lt1"/>
+          </a:fontRef>
+        </p:style>
+        <p:txBody>
+          <a:bodyPr rtlCol="0" anchor="ctr"/>
+          <a:lstStyle/>
+          <a:p>
+            <a:pPr algn="ctr"/>
+            <a:r>
+              <a:rPr lang="en-GB" sz="1800" dirty="0">
+                <a:solidFill>
+                  <a:schemeClr val="bg1"/>
+                </a:solidFill>
+                <a:latin typeface="Arial Rounded MT Bold" panose="020F0704030504030204" pitchFamily="34" charset="0"/>
+              </a:rPr>
+              <a:t>Resource Manager</a:t>
+            </a:r>
+            <a:endParaRPr lang="LID4096" dirty="0">
+              <a:solidFill>
+                <a:schemeClr val="bg1"/>
+              </a:solidFill>
+            </a:endParaRPr>
+          </a:p>
+        </p:txBody>
+      </p:sp>
+      <p:sp>
+        <p:nvSpPr>
+          <p:cNvPr id="9" name="Rectangle: Rounded Corners 8">
+            <a:extLst>
+              <a:ext uri="{FF2B5EF4-FFF2-40B4-BE49-F238E27FC236}">
+                <a16:creationId xmlns:a16="http://schemas.microsoft.com/office/drawing/2014/main" id="{E3D3206F-5CB0-9792-EB3A-756A7B2C6495}"/>
+              </a:ext>
+            </a:extLst>
+          </p:cNvPr>
+          <p:cNvSpPr/>
+          <p:nvPr/>
+        </p:nvSpPr>
+        <p:spPr>
+          <a:xfrm>
+            <a:off x="1614350" y="5827482"/>
+            <a:ext cx="1784588" cy="314071"/>
+          </a:xfrm>
+          <a:prstGeom prst="roundRect">
+            <a:avLst/>
+          </a:prstGeom>
+          <a:solidFill>
+            <a:schemeClr val="dk1">
+              <a:alpha val="50000"/>
+            </a:schemeClr>
+          </a:solidFill>
+          <a:ln>
+            <a:noFill/>
+          </a:ln>
+        </p:spPr>
+        <p:style>
+          <a:lnRef idx="0">
+            <a:scrgbClr r="0" g="0" b="0"/>
+          </a:lnRef>
+          <a:fillRef idx="0">
+            <a:scrgbClr r="0" g="0" b="0"/>
+          </a:fillRef>
+          <a:effectRef idx="0">
+            <a:scrgbClr r="0" g="0" b="0"/>
+          </a:effectRef>
+          <a:fontRef idx="minor">
+            <a:schemeClr val="lt1"/>
+          </a:fontRef>
+        </p:style>
+        <p:txBody>
+          <a:bodyPr rtlCol="0" anchor="ctr"/>
+          <a:lstStyle/>
+          <a:p>
+            <a:pPr algn="ctr"/>
+            <a:endParaRPr lang="LID4096" dirty="0">
+              <a:solidFill>
+                <a:schemeClr val="bg1"/>
+              </a:solidFill>
+            </a:endParaRPr>
+          </a:p>
+        </p:txBody>
+      </p:sp>
+      <p:sp>
+        <p:nvSpPr>
+          <p:cNvPr id="10" name="Rectangle: Rounded Corners 9">
+            <a:extLst>
+              <a:ext uri="{FF2B5EF4-FFF2-40B4-BE49-F238E27FC236}">
+                <a16:creationId xmlns:a16="http://schemas.microsoft.com/office/drawing/2014/main" id="{F1F09290-E730-5E8C-4A22-8B921C66B63E}"/>
+              </a:ext>
+            </a:extLst>
+          </p:cNvPr>
+          <p:cNvSpPr/>
+          <p:nvPr/>
+        </p:nvSpPr>
+        <p:spPr>
+          <a:xfrm>
+            <a:off x="1560809" y="5782792"/>
+            <a:ext cx="1784588" cy="314071"/>
+          </a:xfrm>
+          <a:prstGeom prst="roundRect">
+            <a:avLst/>
+          </a:prstGeom>
+          <a:solidFill>
+            <a:schemeClr val="accent2"/>
+          </a:solidFill>
+          <a:ln>
+            <a:noFill/>
+          </a:ln>
+        </p:spPr>
+        <p:style>
+          <a:lnRef idx="2">
+            <a:schemeClr val="accent1">
+              <a:shade val="50000"/>
+            </a:schemeClr>
+          </a:lnRef>
+          <a:fillRef idx="1">
+            <a:schemeClr val="accent1"/>
+          </a:fillRef>
+          <a:effectRef idx="0">
+            <a:schemeClr val="accent1"/>
+          </a:effectRef>
+          <a:fontRef idx="minor">
+            <a:schemeClr val="lt1"/>
+          </a:fontRef>
+        </p:style>
+        <p:txBody>
+          <a:bodyPr rtlCol="0" anchor="ctr"/>
+          <a:lstStyle/>
+          <a:p>
+            <a:pPr algn="ctr"/>
+            <a:r>
+              <a:rPr lang="en-GB" sz="1800" dirty="0">
+                <a:solidFill>
+                  <a:schemeClr val="bg1"/>
+                </a:solidFill>
+                <a:latin typeface="Arial Rounded MT Bold" panose="020F0704030504030204" pitchFamily="34" charset="0"/>
+              </a:rPr>
+              <a:t>Queue</a:t>
+            </a:r>
+            <a:endParaRPr lang="LID4096" dirty="0">
+              <a:solidFill>
+                <a:schemeClr val="bg1"/>
+              </a:solidFill>
+            </a:endParaRPr>
+          </a:p>
+        </p:txBody>
+      </p:sp>
+      <p:sp>
+        <p:nvSpPr>
+          <p:cNvPr id="11" name="Rectangle: Rounded Corners 10">
+            <a:extLst>
+              <a:ext uri="{FF2B5EF4-FFF2-40B4-BE49-F238E27FC236}">
+                <a16:creationId xmlns:a16="http://schemas.microsoft.com/office/drawing/2014/main" id="{622A5278-7816-0E6C-3255-BF258C604C5E}"/>
+              </a:ext>
+            </a:extLst>
+          </p:cNvPr>
+          <p:cNvSpPr/>
+          <p:nvPr/>
+        </p:nvSpPr>
+        <p:spPr>
+          <a:xfrm>
+            <a:off x="5508819" y="5824501"/>
+            <a:ext cx="1784588" cy="314071"/>
+          </a:xfrm>
+          <a:prstGeom prst="roundRect">
+            <a:avLst/>
+          </a:prstGeom>
+          <a:solidFill>
+            <a:schemeClr val="dk1">
+              <a:alpha val="50000"/>
+            </a:schemeClr>
+          </a:solidFill>
+          <a:ln>
+            <a:noFill/>
+          </a:ln>
+        </p:spPr>
+        <p:style>
+          <a:lnRef idx="0">
+            <a:scrgbClr r="0" g="0" b="0"/>
+          </a:lnRef>
+          <a:fillRef idx="0">
+            <a:scrgbClr r="0" g="0" b="0"/>
+          </a:fillRef>
+          <a:effectRef idx="0">
+            <a:scrgbClr r="0" g="0" b="0"/>
+          </a:effectRef>
+          <a:fontRef idx="minor">
+            <a:schemeClr val="lt1"/>
+          </a:fontRef>
+        </p:style>
+        <p:txBody>
+          <a:bodyPr rtlCol="0" anchor="ctr"/>
+          <a:lstStyle/>
+          <a:p>
+            <a:pPr algn="ctr"/>
+            <a:endParaRPr lang="LID4096" dirty="0">
+              <a:solidFill>
+                <a:schemeClr val="bg1"/>
+              </a:solidFill>
+            </a:endParaRPr>
+          </a:p>
+        </p:txBody>
+      </p:sp>
+      <p:sp>
+        <p:nvSpPr>
+          <p:cNvPr id="12" name="Rectangle: Rounded Corners 11">
+            <a:extLst>
+              <a:ext uri="{FF2B5EF4-FFF2-40B4-BE49-F238E27FC236}">
+                <a16:creationId xmlns:a16="http://schemas.microsoft.com/office/drawing/2014/main" id="{573E0983-FEE5-746A-7360-423A09C9C12E}"/>
+              </a:ext>
+            </a:extLst>
+          </p:cNvPr>
+          <p:cNvSpPr/>
+          <p:nvPr/>
+        </p:nvSpPr>
+        <p:spPr>
+          <a:xfrm>
+            <a:off x="5455278" y="5769493"/>
+            <a:ext cx="1784588" cy="314071"/>
+          </a:xfrm>
+          <a:prstGeom prst="roundRect">
+            <a:avLst/>
+          </a:prstGeom>
+          <a:solidFill>
+            <a:schemeClr val="accent2"/>
+          </a:solidFill>
+          <a:ln>
+            <a:noFill/>
+          </a:ln>
+        </p:spPr>
+        <p:style>
+          <a:lnRef idx="2">
+            <a:schemeClr val="accent1">
+              <a:shade val="50000"/>
+            </a:schemeClr>
+          </a:lnRef>
+          <a:fillRef idx="1">
+            <a:schemeClr val="accent1"/>
+          </a:fillRef>
+          <a:effectRef idx="0">
+            <a:schemeClr val="accent1"/>
+          </a:effectRef>
+          <a:fontRef idx="minor">
+            <a:schemeClr val="lt1"/>
+          </a:fontRef>
+        </p:style>
+        <p:txBody>
+          <a:bodyPr rtlCol="0" anchor="ctr"/>
+          <a:lstStyle/>
+          <a:p>
+            <a:pPr algn="ctr"/>
+            <a:r>
+              <a:rPr lang="en-GB" sz="1800" dirty="0">
+                <a:solidFill>
+                  <a:schemeClr val="bg1"/>
+                </a:solidFill>
+                <a:latin typeface="Arial Rounded MT Bold" panose="020F0704030504030204" pitchFamily="34" charset="0"/>
+              </a:rPr>
+              <a:t>Resource</a:t>
+            </a:r>
+            <a:endParaRPr lang="LID4096" dirty="0">
+              <a:solidFill>
+                <a:schemeClr val="bg1"/>
+              </a:solidFill>
+            </a:endParaRPr>
+          </a:p>
+        </p:txBody>
+      </p:sp>
+      <p:sp>
+        <p:nvSpPr>
+          <p:cNvPr id="13" name="Rectangle: Rounded Corners 12">
+            <a:extLst>
+              <a:ext uri="{FF2B5EF4-FFF2-40B4-BE49-F238E27FC236}">
+                <a16:creationId xmlns:a16="http://schemas.microsoft.com/office/drawing/2014/main" id="{2EF76C21-B456-0EE4-6BDB-6F29570F44BB}"/>
+              </a:ext>
+            </a:extLst>
+          </p:cNvPr>
+          <p:cNvSpPr/>
+          <p:nvPr/>
+        </p:nvSpPr>
+        <p:spPr>
+          <a:xfrm>
+            <a:off x="4641181" y="2258049"/>
+            <a:ext cx="1428159" cy="618157"/>
+          </a:xfrm>
+          <a:prstGeom prst="roundRect">
+            <a:avLst/>
+          </a:prstGeom>
+          <a:solidFill>
+            <a:schemeClr val="dk1">
+              <a:alpha val="50000"/>
+            </a:schemeClr>
+          </a:solidFill>
+          <a:ln>
+            <a:noFill/>
+          </a:ln>
+        </p:spPr>
+        <p:style>
+          <a:lnRef idx="0">
+            <a:scrgbClr r="0" g="0" b="0"/>
+          </a:lnRef>
+          <a:fillRef idx="0">
+            <a:scrgbClr r="0" g="0" b="0"/>
+          </a:fillRef>
+          <a:effectRef idx="0">
+            <a:scrgbClr r="0" g="0" b="0"/>
+          </a:effectRef>
+          <a:fontRef idx="minor">
+            <a:schemeClr val="lt1"/>
+          </a:fontRef>
+        </p:style>
+        <p:txBody>
+          <a:bodyPr rtlCol="0" anchor="ctr"/>
+          <a:lstStyle/>
+          <a:p>
+            <a:pPr algn="ctr"/>
+            <a:endParaRPr lang="LID4096" dirty="0">
+              <a:solidFill>
+                <a:schemeClr val="bg1"/>
+              </a:solidFill>
+            </a:endParaRPr>
+          </a:p>
+        </p:txBody>
+      </p:sp>
+      <p:sp>
+        <p:nvSpPr>
+          <p:cNvPr id="14" name="Rectangle: Rounded Corners 13">
+            <a:extLst>
+              <a:ext uri="{FF2B5EF4-FFF2-40B4-BE49-F238E27FC236}">
+                <a16:creationId xmlns:a16="http://schemas.microsoft.com/office/drawing/2014/main" id="{8A3017A5-F3BC-1E84-ECA6-61EB353F4ADE}"/>
+              </a:ext>
+            </a:extLst>
+          </p:cNvPr>
+          <p:cNvSpPr/>
+          <p:nvPr/>
+        </p:nvSpPr>
+        <p:spPr>
+          <a:xfrm>
+            <a:off x="4587640" y="2203041"/>
+            <a:ext cx="1428159" cy="618157"/>
+          </a:xfrm>
+          <a:prstGeom prst="roundRect">
+            <a:avLst/>
+          </a:prstGeom>
+          <a:solidFill>
+            <a:schemeClr val="accent2"/>
+          </a:solidFill>
+          <a:ln>
+            <a:noFill/>
+          </a:ln>
+        </p:spPr>
+        <p:style>
+          <a:lnRef idx="2">
+            <a:schemeClr val="accent1">
+              <a:shade val="50000"/>
+            </a:schemeClr>
+          </a:lnRef>
+          <a:fillRef idx="1">
+            <a:schemeClr val="accent1"/>
+          </a:fillRef>
+          <a:effectRef idx="0">
+            <a:schemeClr val="accent1"/>
+          </a:effectRef>
+          <a:fontRef idx="minor">
+            <a:schemeClr val="lt1"/>
+          </a:fontRef>
+        </p:style>
+        <p:txBody>
+          <a:bodyPr rtlCol="0" anchor="ctr"/>
+          <a:lstStyle/>
+          <a:p>
+            <a:pPr algn="ctr"/>
+            <a:r>
+              <a:rPr lang="en-GB" sz="1800" dirty="0">
+                <a:solidFill>
+                  <a:schemeClr val="bg1"/>
+                </a:solidFill>
+                <a:latin typeface="Arial Rounded MT Bold" panose="020F0704030504030204" pitchFamily="34" charset="0"/>
+              </a:rPr>
+              <a:t>Resource Manager</a:t>
+            </a:r>
+            <a:endParaRPr lang="LID4096" dirty="0">
+              <a:solidFill>
+                <a:schemeClr val="bg1"/>
+              </a:solidFill>
+            </a:endParaRPr>
+          </a:p>
+        </p:txBody>
+      </p:sp>
+      <p:sp>
+        <p:nvSpPr>
+          <p:cNvPr id="15" name="Rectangle: Rounded Corners 14">
+            <a:extLst>
+              <a:ext uri="{FF2B5EF4-FFF2-40B4-BE49-F238E27FC236}">
+                <a16:creationId xmlns:a16="http://schemas.microsoft.com/office/drawing/2014/main" id="{3043BE6A-B6D2-88A1-CEF1-E3F9E34C556A}"/>
+              </a:ext>
+            </a:extLst>
+          </p:cNvPr>
+          <p:cNvSpPr/>
+          <p:nvPr/>
+        </p:nvSpPr>
+        <p:spPr>
+          <a:xfrm>
+            <a:off x="6703796" y="2294426"/>
+            <a:ext cx="1428159" cy="618157"/>
+          </a:xfrm>
+          <a:prstGeom prst="roundRect">
+            <a:avLst/>
+          </a:prstGeom>
+          <a:solidFill>
+            <a:schemeClr val="dk1">
+              <a:alpha val="50000"/>
+            </a:schemeClr>
+          </a:solidFill>
+          <a:ln>
+            <a:noFill/>
+          </a:ln>
+        </p:spPr>
+        <p:style>
+          <a:lnRef idx="0">
+            <a:scrgbClr r="0" g="0" b="0"/>
+          </a:lnRef>
+          <a:fillRef idx="0">
+            <a:scrgbClr r="0" g="0" b="0"/>
+          </a:fillRef>
+          <a:effectRef idx="0">
+            <a:scrgbClr r="0" g="0" b="0"/>
+          </a:effectRef>
+          <a:fontRef idx="minor">
+            <a:schemeClr val="lt1"/>
+          </a:fontRef>
+        </p:style>
+        <p:txBody>
+          <a:bodyPr rtlCol="0" anchor="ctr"/>
+          <a:lstStyle/>
+          <a:p>
+            <a:pPr algn="ctr"/>
+            <a:endParaRPr lang="LID4096" dirty="0">
+              <a:solidFill>
+                <a:schemeClr val="bg1"/>
+              </a:solidFill>
+            </a:endParaRPr>
+          </a:p>
+        </p:txBody>
+      </p:sp>
+      <p:sp>
+        <p:nvSpPr>
+          <p:cNvPr id="16" name="Rectangle: Rounded Corners 15">
+            <a:extLst>
+              <a:ext uri="{FF2B5EF4-FFF2-40B4-BE49-F238E27FC236}">
+                <a16:creationId xmlns:a16="http://schemas.microsoft.com/office/drawing/2014/main" id="{E175C90C-50B3-D400-F587-0CD643DB3D33}"/>
+              </a:ext>
+            </a:extLst>
+          </p:cNvPr>
+          <p:cNvSpPr/>
+          <p:nvPr/>
+        </p:nvSpPr>
+        <p:spPr>
+          <a:xfrm>
+            <a:off x="6650255" y="2239418"/>
+            <a:ext cx="1428159" cy="618157"/>
+          </a:xfrm>
+          <a:prstGeom prst="roundRect">
+            <a:avLst/>
+          </a:prstGeom>
+          <a:solidFill>
+            <a:schemeClr val="accent2"/>
+          </a:solidFill>
+          <a:ln>
+            <a:noFill/>
+          </a:ln>
+        </p:spPr>
+        <p:style>
+          <a:lnRef idx="2">
+            <a:schemeClr val="accent1">
+              <a:shade val="50000"/>
+            </a:schemeClr>
+          </a:lnRef>
+          <a:fillRef idx="1">
+            <a:schemeClr val="accent1"/>
+          </a:fillRef>
+          <a:effectRef idx="0">
+            <a:schemeClr val="accent1"/>
+          </a:effectRef>
+          <a:fontRef idx="minor">
+            <a:schemeClr val="lt1"/>
+          </a:fontRef>
+        </p:style>
+        <p:txBody>
+          <a:bodyPr rtlCol="0" anchor="ctr"/>
+          <a:lstStyle/>
+          <a:p>
+            <a:pPr algn="ctr"/>
+            <a:r>
+              <a:rPr lang="en-GB" sz="1800" dirty="0">
+                <a:solidFill>
+                  <a:schemeClr val="bg1"/>
+                </a:solidFill>
+                <a:latin typeface="Arial Rounded MT Bold" panose="020F0704030504030204" pitchFamily="34" charset="0"/>
+              </a:rPr>
+              <a:t>Resource Manager</a:t>
+            </a:r>
+            <a:endParaRPr lang="LID4096" dirty="0">
+              <a:solidFill>
+                <a:schemeClr val="bg1"/>
+              </a:solidFill>
+            </a:endParaRPr>
+          </a:p>
+        </p:txBody>
+      </p:sp>
+      <p:sp>
+        <p:nvSpPr>
+          <p:cNvPr id="23" name="Rectangle: Rounded Corners 22">
+            <a:extLst>
+              <a:ext uri="{FF2B5EF4-FFF2-40B4-BE49-F238E27FC236}">
+                <a16:creationId xmlns:a16="http://schemas.microsoft.com/office/drawing/2014/main" id="{206E8D8E-4143-0E65-99C8-E9ABDBDCCA79}"/>
+              </a:ext>
+            </a:extLst>
+          </p:cNvPr>
+          <p:cNvSpPr/>
+          <p:nvPr/>
+        </p:nvSpPr>
+        <p:spPr>
+          <a:xfrm>
+            <a:off x="10297019" y="456999"/>
+            <a:ext cx="1423702" cy="461147"/>
+          </a:xfrm>
+          <a:prstGeom prst="roundRect">
+            <a:avLst/>
+          </a:prstGeom>
+          <a:solidFill>
+            <a:schemeClr val="accent4">
+              <a:lumMod val="40000"/>
+              <a:lumOff val="60000"/>
+              <a:alpha val="50000"/>
+            </a:schemeClr>
+          </a:solidFill>
+          <a:ln>
+            <a:noFill/>
+          </a:ln>
+        </p:spPr>
+        <p:style>
+          <a:lnRef idx="0">
+            <a:scrgbClr r="0" g="0" b="0"/>
+          </a:lnRef>
+          <a:fillRef idx="0">
+            <a:scrgbClr r="0" g="0" b="0"/>
+          </a:fillRef>
+          <a:effectRef idx="0">
+            <a:scrgbClr r="0" g="0" b="0"/>
+          </a:effectRef>
+          <a:fontRef idx="minor">
+            <a:schemeClr val="lt1"/>
+          </a:fontRef>
+        </p:style>
+        <p:txBody>
+          <a:bodyPr rtlCol="0" anchor="ctr"/>
+          <a:lstStyle/>
+          <a:p>
+            <a:pPr algn="ctr"/>
+            <a:r>
+              <a:rPr lang="en-GB" dirty="0">
+                <a:solidFill>
+                  <a:schemeClr val="accent2"/>
+                </a:solidFill>
+                <a:latin typeface="Arial Rounded MT Bold" panose="020F0704030504030204" pitchFamily="34" charset="0"/>
+              </a:rPr>
+              <a:t>Process</a:t>
+            </a:r>
+            <a:endParaRPr lang="LID4096" dirty="0">
+              <a:solidFill>
+                <a:schemeClr val="accent2"/>
+              </a:solidFill>
+              <a:latin typeface="Arial Rounded MT Bold" panose="020F0704030504030204" pitchFamily="34" charset="0"/>
+            </a:endParaRPr>
+          </a:p>
+        </p:txBody>
+      </p:sp>
+      <p:sp>
+        <p:nvSpPr>
+          <p:cNvPr id="24" name="Rectangle: Rounded Corners 23">
+            <a:extLst>
+              <a:ext uri="{FF2B5EF4-FFF2-40B4-BE49-F238E27FC236}">
+                <a16:creationId xmlns:a16="http://schemas.microsoft.com/office/drawing/2014/main" id="{30571461-B398-BCE4-5125-7913BB1E9699}"/>
+              </a:ext>
+            </a:extLst>
+          </p:cNvPr>
+          <p:cNvSpPr/>
+          <p:nvPr/>
+        </p:nvSpPr>
+        <p:spPr>
+          <a:xfrm>
+            <a:off x="10310622" y="1075255"/>
+            <a:ext cx="1500301" cy="461147"/>
+          </a:xfrm>
+          <a:prstGeom prst="roundRect">
+            <a:avLst/>
+          </a:prstGeom>
+          <a:solidFill>
+            <a:schemeClr val="accent2">
+              <a:lumMod val="60000"/>
+              <a:lumOff val="40000"/>
+              <a:alpha val="50000"/>
+            </a:schemeClr>
+          </a:solidFill>
+          <a:ln>
+            <a:noFill/>
+          </a:ln>
+        </p:spPr>
+        <p:style>
+          <a:lnRef idx="0">
+            <a:scrgbClr r="0" g="0" b="0"/>
+          </a:lnRef>
+          <a:fillRef idx="0">
+            <a:scrgbClr r="0" g="0" b="0"/>
+          </a:fillRef>
+          <a:effectRef idx="0">
+            <a:scrgbClr r="0" g="0" b="0"/>
+          </a:effectRef>
+          <a:fontRef idx="minor">
+            <a:schemeClr val="lt1"/>
+          </a:fontRef>
+        </p:style>
+        <p:txBody>
+          <a:bodyPr rtlCol="0" anchor="ctr"/>
+          <a:lstStyle/>
+          <a:p>
+            <a:pPr algn="ctr"/>
+            <a:r>
+              <a:rPr lang="en-GB" dirty="0">
+                <a:solidFill>
+                  <a:schemeClr val="accent2"/>
+                </a:solidFill>
+                <a:latin typeface="Arial Rounded MT Bold" panose="020F0704030504030204" pitchFamily="34" charset="0"/>
+              </a:rPr>
+              <a:t>Memory</a:t>
+            </a:r>
+            <a:endParaRPr lang="LID4096" dirty="0">
+              <a:solidFill>
+                <a:schemeClr val="accent2"/>
+              </a:solidFill>
+              <a:latin typeface="Arial Rounded MT Bold" panose="020F0704030504030204" pitchFamily="34" charset="0"/>
+            </a:endParaRPr>
+          </a:p>
+        </p:txBody>
+      </p:sp>
+      <p:sp>
+        <p:nvSpPr>
+          <p:cNvPr id="25" name="Rectangle: Rounded Corners 24">
+            <a:extLst>
+              <a:ext uri="{FF2B5EF4-FFF2-40B4-BE49-F238E27FC236}">
+                <a16:creationId xmlns:a16="http://schemas.microsoft.com/office/drawing/2014/main" id="{45D6834D-3ADA-0CAA-7EB1-5512748CD365}"/>
+              </a:ext>
+            </a:extLst>
+          </p:cNvPr>
+          <p:cNvSpPr/>
+          <p:nvPr/>
+        </p:nvSpPr>
+        <p:spPr>
+          <a:xfrm>
+            <a:off x="8544022" y="1893990"/>
+            <a:ext cx="1752997" cy="3181227"/>
+          </a:xfrm>
+          <a:prstGeom prst="roundRect">
+            <a:avLst/>
+          </a:prstGeom>
+          <a:solidFill>
+            <a:schemeClr val="accent4">
+              <a:lumMod val="40000"/>
+              <a:lumOff val="60000"/>
+              <a:alpha val="50000"/>
+            </a:schemeClr>
+          </a:solidFill>
+          <a:ln>
+            <a:noFill/>
+          </a:ln>
+        </p:spPr>
+        <p:style>
+          <a:lnRef idx="0">
+            <a:scrgbClr r="0" g="0" b="0"/>
+          </a:lnRef>
+          <a:fillRef idx="0">
+            <a:scrgbClr r="0" g="0" b="0"/>
+          </a:fillRef>
+          <a:effectRef idx="0">
+            <a:scrgbClr r="0" g="0" b="0"/>
+          </a:effectRef>
+          <a:fontRef idx="minor">
+            <a:schemeClr val="lt1"/>
+          </a:fontRef>
+        </p:style>
+        <p:txBody>
+          <a:bodyPr rtlCol="0" anchor="ctr"/>
+          <a:lstStyle/>
+          <a:p>
+            <a:pPr algn="ctr"/>
+            <a:endParaRPr lang="LID4096" dirty="0">
+              <a:solidFill>
+                <a:schemeClr val="bg1"/>
+              </a:solidFill>
+            </a:endParaRPr>
+          </a:p>
+        </p:txBody>
+      </p:sp>
+      <p:sp>
+        <p:nvSpPr>
+          <p:cNvPr id="26" name="Rectangle: Rounded Corners 25">
+            <a:extLst>
+              <a:ext uri="{FF2B5EF4-FFF2-40B4-BE49-F238E27FC236}">
+                <a16:creationId xmlns:a16="http://schemas.microsoft.com/office/drawing/2014/main" id="{F4FC1AB9-3B06-841E-129B-A1AF51DC2FD0}"/>
+              </a:ext>
+            </a:extLst>
+          </p:cNvPr>
+          <p:cNvSpPr/>
+          <p:nvPr/>
+        </p:nvSpPr>
+        <p:spPr>
+          <a:xfrm>
+            <a:off x="8711062" y="2275339"/>
+            <a:ext cx="1520149" cy="618157"/>
+          </a:xfrm>
+          <a:prstGeom prst="roundRect">
+            <a:avLst/>
+          </a:prstGeom>
+          <a:solidFill>
+            <a:schemeClr val="dk1">
+              <a:alpha val="50000"/>
+            </a:schemeClr>
+          </a:solidFill>
+          <a:ln>
+            <a:noFill/>
+          </a:ln>
+        </p:spPr>
+        <p:style>
+          <a:lnRef idx="0">
+            <a:scrgbClr r="0" g="0" b="0"/>
+          </a:lnRef>
+          <a:fillRef idx="0">
+            <a:scrgbClr r="0" g="0" b="0"/>
+          </a:fillRef>
+          <a:effectRef idx="0">
+            <a:scrgbClr r="0" g="0" b="0"/>
+          </a:effectRef>
+          <a:fontRef idx="minor">
+            <a:schemeClr val="lt1"/>
+          </a:fontRef>
+        </p:style>
+        <p:txBody>
+          <a:bodyPr rtlCol="0" anchor="ctr"/>
+          <a:lstStyle/>
+          <a:p>
+            <a:pPr algn="ctr"/>
+            <a:endParaRPr lang="LID4096" dirty="0">
+              <a:solidFill>
+                <a:schemeClr val="bg1"/>
+              </a:solidFill>
+            </a:endParaRPr>
+          </a:p>
+        </p:txBody>
+      </p:sp>
+      <p:sp>
+        <p:nvSpPr>
+          <p:cNvPr id="27" name="Rectangle: Rounded Corners 26">
+            <a:extLst>
+              <a:ext uri="{FF2B5EF4-FFF2-40B4-BE49-F238E27FC236}">
+                <a16:creationId xmlns:a16="http://schemas.microsoft.com/office/drawing/2014/main" id="{EF846AAA-A5C1-5585-76AE-F6E0B89BF1BB}"/>
+              </a:ext>
+            </a:extLst>
+          </p:cNvPr>
+          <p:cNvSpPr/>
+          <p:nvPr/>
+        </p:nvSpPr>
+        <p:spPr>
+          <a:xfrm>
+            <a:off x="8657521" y="2220331"/>
+            <a:ext cx="1520149" cy="618157"/>
+          </a:xfrm>
+          <a:prstGeom prst="roundRect">
+            <a:avLst/>
+          </a:prstGeom>
+          <a:solidFill>
+            <a:srgbClr val="FF0000"/>
+          </a:solidFill>
+          <a:ln>
+            <a:noFill/>
+          </a:ln>
+        </p:spPr>
+        <p:style>
+          <a:lnRef idx="2">
+            <a:schemeClr val="accent1">
+              <a:shade val="50000"/>
+            </a:schemeClr>
+          </a:lnRef>
+          <a:fillRef idx="1">
+            <a:schemeClr val="accent1"/>
+          </a:fillRef>
+          <a:effectRef idx="0">
+            <a:schemeClr val="accent1"/>
+          </a:effectRef>
+          <a:fontRef idx="minor">
+            <a:schemeClr val="lt1"/>
+          </a:fontRef>
+        </p:style>
+        <p:txBody>
+          <a:bodyPr rtlCol="0" anchor="ctr"/>
+          <a:lstStyle/>
+          <a:p>
+            <a:pPr algn="ctr"/>
+            <a:r>
+              <a:rPr lang="en-GB" sz="1800" dirty="0">
+                <a:solidFill>
+                  <a:schemeClr val="bg1"/>
+                </a:solidFill>
+                <a:latin typeface="Arial Rounded MT Bold" panose="020F0704030504030204" pitchFamily="34" charset="0"/>
+              </a:rPr>
+              <a:t>Requesting car</a:t>
+            </a:r>
+            <a:endParaRPr lang="LID4096" dirty="0">
+              <a:solidFill>
+                <a:schemeClr val="bg1"/>
+              </a:solidFill>
+            </a:endParaRPr>
+          </a:p>
+        </p:txBody>
+      </p:sp>
+    </p:spTree>
+    <p:extLst>
+      <p:ext uri="{BB962C8B-B14F-4D97-AF65-F5344CB8AC3E}">
+        <p14:creationId xmlns:p14="http://schemas.microsoft.com/office/powerpoint/2010/main" val="2662737227"/>
       </p:ext>
     </p:extLst>
   </p:cSld>
@@ -7851,16 +9689,7 @@
                 </a:solidFill>
                 <a:latin typeface="Arial Rounded MT Bold" panose="020F0704030504030204" pitchFamily="34" charset="0"/>
               </a:rPr>
-              <a:t>Resource </a:t>
-            </a:r>
-            <a:r>
-              <a:rPr lang="en-GB" sz="1800" dirty="0" err="1">
-                <a:solidFill>
-                  <a:schemeClr val="bg1"/>
-                </a:solidFill>
-                <a:latin typeface="Arial Rounded MT Bold" panose="020F0704030504030204" pitchFamily="34" charset="0"/>
-              </a:rPr>
-              <a:t>Mananger</a:t>
+              <a:t>Resource Manager</a:t>
             </a:r>
             <a:endParaRPr lang="LID4096" dirty="0">
               <a:solidFill>
@@ -8344,7 +10173,7 @@
                 </a:solidFill>
                 <a:latin typeface="Arial Rounded MT Bold" panose="020F0704030504030204" pitchFamily="34" charset="0"/>
               </a:rPr>
-              <a:t>Behavioral model                        VHDL</a:t>
+              <a:t>State Chart      					Simulation</a:t>
             </a:r>
           </a:p>
         </p:txBody>
@@ -8486,6 +10315,380 @@
           </a:p>
         </p:txBody>
       </p:sp>
+    </p:spTree>
+    <p:extLst>
+      <p:ext uri="{BB962C8B-B14F-4D97-AF65-F5344CB8AC3E}">
+        <p14:creationId xmlns:p14="http://schemas.microsoft.com/office/powerpoint/2010/main" val="1761188601"/>
+      </p:ext>
+    </p:extLst>
+  </p:cSld>
+  <p:clrMapOvr>
+    <a:masterClrMapping/>
+  </p:clrMapOvr>
+</p:sld>
+</file>
+
+<file path=ppt/slides/slide9.xml><?xml version="1.0" encoding="utf-8"?>
+<p:sld xmlns:a="http://schemas.openxmlformats.org/drawingml/2006/main" xmlns:r="http://schemas.openxmlformats.org/officeDocument/2006/relationships" xmlns:p="http://schemas.openxmlformats.org/presentationml/2006/main">
+  <p:cSld>
+    <p:bg>
+      <p:bgPr>
+        <a:solidFill>
+          <a:schemeClr val="bg1"/>
+        </a:solidFill>
+        <a:effectLst/>
+      </p:bgPr>
+    </p:bg>
+    <p:spTree>
+      <p:nvGrpSpPr>
+        <p:cNvPr id="1" name=""/>
+        <p:cNvGrpSpPr/>
+        <p:nvPr/>
+      </p:nvGrpSpPr>
+      <p:grpSpPr>
+        <a:xfrm>
+          <a:off x="0" y="0"/>
+          <a:ext cx="0" cy="0"/>
+          <a:chOff x="0" y="0"/>
+          <a:chExt cx="0" cy="0"/>
+        </a:xfrm>
+      </p:grpSpPr>
+      <p:sp useBgFill="1">
+        <p:nvSpPr>
+          <p:cNvPr id="23" name="Rectangle 22">
+            <a:extLst>
+              <a:ext uri="{FF2B5EF4-FFF2-40B4-BE49-F238E27FC236}">
+                <a16:creationId xmlns:a16="http://schemas.microsoft.com/office/drawing/2014/main" id="{017517EF-BD4D-4055-BDB4-A322C53568AD}"/>
+              </a:ext>
+              <a:ext uri="{C183D7F6-B498-43B3-948B-1728B52AA6E4}">
+                <adec:decorative xmlns:adec="http://schemas.microsoft.com/office/drawing/2017/decorative" val="1"/>
+              </a:ext>
+            </a:extLst>
+          </p:cNvPr>
+          <p:cNvSpPr>
+            <a:spLocks noGrp="1" noRot="1" noChangeAspect="1" noMove="1" noResize="1" noEditPoints="1" noAdjustHandles="1" noChangeArrowheads="1" noChangeShapeType="1" noTextEdit="1"/>
+          </p:cNvSpPr>
+          <p:nvPr>
+            <p:extLst>
+              <p:ext uri="{386F3935-93C4-4BCD-93E2-E3B085C9AB24}">
+                <p16:designElem xmlns:p16="http://schemas.microsoft.com/office/powerpoint/2015/main" val="1"/>
+              </p:ext>
+            </p:extLst>
+          </p:nvPr>
+        </p:nvSpPr>
+        <p:spPr>
+          <a:xfrm>
+            <a:off x="0" y="0"/>
+            <a:ext cx="12192000" cy="6858000"/>
+          </a:xfrm>
+          <a:prstGeom prst="rect">
+            <a:avLst/>
+          </a:prstGeom>
+          <a:ln>
+            <a:noFill/>
+          </a:ln>
+        </p:spPr>
+        <p:style>
+          <a:lnRef idx="2">
+            <a:schemeClr val="accent1">
+              <a:shade val="50000"/>
+            </a:schemeClr>
+          </a:lnRef>
+          <a:fillRef idx="1">
+            <a:schemeClr val="accent1"/>
+          </a:fillRef>
+          <a:effectRef idx="0">
+            <a:schemeClr val="accent1"/>
+          </a:effectRef>
+          <a:fontRef idx="minor">
+            <a:schemeClr val="lt1"/>
+          </a:fontRef>
+        </p:style>
+        <p:txBody>
+          <a:bodyPr rtlCol="0" anchor="ctr"/>
+          <a:lstStyle/>
+          <a:p>
+            <a:pPr algn="ctr"/>
+            <a:endParaRPr lang="en-US"/>
+          </a:p>
+        </p:txBody>
+      </p:sp>
+      <p:sp useBgFill="1">
+        <p:nvSpPr>
+          <p:cNvPr id="25" name="Rectangle 24">
+            <a:extLst>
+              <a:ext uri="{FF2B5EF4-FFF2-40B4-BE49-F238E27FC236}">
+                <a16:creationId xmlns:a16="http://schemas.microsoft.com/office/drawing/2014/main" id="{0ADDB668-2CA4-4D2B-9C34-3487CA330BA8}"/>
+              </a:ext>
+              <a:ext uri="{C183D7F6-B498-43B3-948B-1728B52AA6E4}">
+                <adec:decorative xmlns:adec="http://schemas.microsoft.com/office/drawing/2017/decorative" val="1"/>
+              </a:ext>
+            </a:extLst>
+          </p:cNvPr>
+          <p:cNvSpPr>
+            <a:spLocks noGrp="1" noRot="1" noChangeAspect="1" noMove="1" noResize="1" noEditPoints="1" noAdjustHandles="1" noChangeArrowheads="1" noChangeShapeType="1" noTextEdit="1"/>
+          </p:cNvSpPr>
+          <p:nvPr>
+            <p:extLst>
+              <p:ext uri="{386F3935-93C4-4BCD-93E2-E3B085C9AB24}">
+                <p16:designElem xmlns:p16="http://schemas.microsoft.com/office/powerpoint/2015/main" val="1"/>
+              </p:ext>
+            </p:extLst>
+          </p:nvPr>
+        </p:nvSpPr>
+        <p:spPr>
+          <a:xfrm>
+            <a:off x="551553" y="304802"/>
+            <a:ext cx="11097349" cy="1573149"/>
+          </a:xfrm>
+          <a:prstGeom prst="rect">
+            <a:avLst/>
+          </a:prstGeom>
+          <a:ln w="12700">
+            <a:solidFill>
+              <a:srgbClr val="DEDEDE"/>
+            </a:solidFill>
+          </a:ln>
+          <a:effectLst>
+            <a:outerShdw blurRad="50800" dist="38100" dir="2700000" algn="tl" rotWithShape="0">
+              <a:schemeClr val="bg2">
+                <a:lumMod val="85000"/>
+                <a:alpha val="50000"/>
+              </a:schemeClr>
+            </a:outerShdw>
+          </a:effectLst>
+        </p:spPr>
+        <p:style>
+          <a:lnRef idx="2">
+            <a:schemeClr val="accent1">
+              <a:shade val="50000"/>
+            </a:schemeClr>
+          </a:lnRef>
+          <a:fillRef idx="1">
+            <a:schemeClr val="accent1"/>
+          </a:fillRef>
+          <a:effectRef idx="0">
+            <a:schemeClr val="accent1"/>
+          </a:effectRef>
+          <a:fontRef idx="minor">
+            <a:schemeClr val="lt1"/>
+          </a:fontRef>
+        </p:style>
+        <p:txBody>
+          <a:bodyPr rtlCol="0" anchor="ctr"/>
+          <a:lstStyle/>
+          <a:p>
+            <a:pPr marL="0" marR="0" lvl="0" indent="0" algn="ctr" defTabSz="914400" rtl="0" eaLnBrk="1" fontAlgn="auto" latinLnBrk="0" hangingPunct="1">
+              <a:lnSpc>
+                <a:spcPct val="100000"/>
+              </a:lnSpc>
+              <a:spcBef>
+                <a:spcPts val="0"/>
+              </a:spcBef>
+              <a:spcAft>
+                <a:spcPts val="0"/>
+              </a:spcAft>
+              <a:buClrTx/>
+              <a:buSzTx/>
+              <a:buFontTx/>
+              <a:buNone/>
+              <a:tabLst/>
+              <a:defRPr/>
+            </a:pPr>
+            <a:endParaRPr kumimoji="0" lang="en-US" sz="1800" b="0" i="0" u="none" strike="noStrike" kern="1200" cap="none" spc="0" normalizeH="0" baseline="0" noProof="0">
+              <a:ln>
+                <a:noFill/>
+              </a:ln>
+              <a:solidFill>
+                <a:prstClr val="white"/>
+              </a:solidFill>
+              <a:effectLst/>
+              <a:uLnTx/>
+              <a:uFillTx/>
+              <a:latin typeface="Calibri" panose="020F0502020204030204"/>
+              <a:ea typeface="+mn-ea"/>
+              <a:cs typeface="+mn-cs"/>
+            </a:endParaRPr>
+          </a:p>
+        </p:txBody>
+      </p:sp>
+      <p:sp>
+        <p:nvSpPr>
+          <p:cNvPr id="2" name="Title 1">
+            <a:extLst>
+              <a:ext uri="{FF2B5EF4-FFF2-40B4-BE49-F238E27FC236}">
+                <a16:creationId xmlns:a16="http://schemas.microsoft.com/office/drawing/2014/main" id="{9AD481CF-C894-AB59-F5F3-CBE2D7C81A09}"/>
+              </a:ext>
+            </a:extLst>
+          </p:cNvPr>
+          <p:cNvSpPr>
+            <a:spLocks noGrp="1"/>
+          </p:cNvSpPr>
+          <p:nvPr>
+            <p:ph type="title"/>
+          </p:nvPr>
+        </p:nvSpPr>
+        <p:spPr>
+          <a:xfrm>
+            <a:off x="901690" y="405575"/>
+            <a:ext cx="10617210" cy="1371600"/>
+          </a:xfrm>
+        </p:spPr>
+        <p:txBody>
+          <a:bodyPr vert="horz" lIns="91440" tIns="45720" rIns="91440" bIns="45720" rtlCol="0" anchor="ctr">
+            <a:normAutofit/>
+          </a:bodyPr>
+          <a:lstStyle/>
+          <a:p>
+            <a:r>
+              <a:rPr lang="en-US" sz="4000" kern="1200" dirty="0">
+                <a:solidFill>
+                  <a:schemeClr val="tx1"/>
+                </a:solidFill>
+                <a:latin typeface="Arial Rounded MT Bold" panose="020F0704030504030204" pitchFamily="34" charset="0"/>
+              </a:rPr>
+              <a:t>Behavioral model                        VHDL</a:t>
+            </a:r>
+          </a:p>
+        </p:txBody>
+      </p:sp>
+      <p:sp>
+        <p:nvSpPr>
+          <p:cNvPr id="27" name="Rectangle 26">
+            <a:extLst>
+              <a:ext uri="{FF2B5EF4-FFF2-40B4-BE49-F238E27FC236}">
+                <a16:creationId xmlns:a16="http://schemas.microsoft.com/office/drawing/2014/main" id="{2568BC19-F052-4108-93E1-6A3D1DEC072F}"/>
+              </a:ext>
+              <a:ext uri="{C183D7F6-B498-43B3-948B-1728B52AA6E4}">
+                <adec:decorative xmlns:adec="http://schemas.microsoft.com/office/drawing/2017/decorative" val="1"/>
+              </a:ext>
+            </a:extLst>
+          </p:cNvPr>
+          <p:cNvSpPr>
+            <a:spLocks noGrp="1" noRot="1" noChangeAspect="1" noMove="1" noResize="1" noEditPoints="1" noAdjustHandles="1" noChangeArrowheads="1" noChangeShapeType="1" noTextEdit="1"/>
+          </p:cNvSpPr>
+          <p:nvPr>
+            <p:extLst>
+              <p:ext uri="{386F3935-93C4-4BCD-93E2-E3B085C9AB24}">
+                <p16:designElem xmlns:p16="http://schemas.microsoft.com/office/powerpoint/2015/main" val="1"/>
+              </p:ext>
+            </p:extLst>
+          </p:nvPr>
+        </p:nvSpPr>
+        <p:spPr>
+          <a:xfrm>
+            <a:off x="494784" y="764424"/>
+            <a:ext cx="128016" cy="653903"/>
+          </a:xfrm>
+          <a:prstGeom prst="rect">
+            <a:avLst/>
+          </a:prstGeom>
+          <a:solidFill>
+            <a:schemeClr val="accent2"/>
+          </a:solidFill>
+          <a:ln>
+            <a:noFill/>
+          </a:ln>
+        </p:spPr>
+        <p:style>
+          <a:lnRef idx="2">
+            <a:schemeClr val="accent1">
+              <a:shade val="50000"/>
+            </a:schemeClr>
+          </a:lnRef>
+          <a:fillRef idx="1">
+            <a:schemeClr val="accent1"/>
+          </a:fillRef>
+          <a:effectRef idx="0">
+            <a:schemeClr val="accent1"/>
+          </a:effectRef>
+          <a:fontRef idx="minor">
+            <a:schemeClr val="lt1"/>
+          </a:fontRef>
+        </p:style>
+        <p:txBody>
+          <a:bodyPr rtlCol="0" anchor="ctr"/>
+          <a:lstStyle/>
+          <a:p>
+            <a:pPr algn="ctr"/>
+            <a:endParaRPr lang="en-US">
+              <a:solidFill>
+                <a:prstClr val="white"/>
+              </a:solidFill>
+              <a:latin typeface="Calibri" panose="020F0502020204030204"/>
+            </a:endParaRPr>
+          </a:p>
+        </p:txBody>
+      </p:sp>
+      <p:sp>
+        <p:nvSpPr>
+          <p:cNvPr id="29" name="Rectangle 28">
+            <a:extLst>
+              <a:ext uri="{FF2B5EF4-FFF2-40B4-BE49-F238E27FC236}">
+                <a16:creationId xmlns:a16="http://schemas.microsoft.com/office/drawing/2014/main" id="{D5FD337D-4D6B-4C8B-B6F5-121097E09881}"/>
+              </a:ext>
+              <a:ext uri="{C183D7F6-B498-43B3-948B-1728B52AA6E4}">
+                <adec:decorative xmlns:adec="http://schemas.microsoft.com/office/drawing/2017/decorative" val="1"/>
+              </a:ext>
+            </a:extLst>
+          </p:cNvPr>
+          <p:cNvSpPr>
+            <a:spLocks noGrp="1" noRot="1" noChangeAspect="1" noMove="1" noResize="1" noEditPoints="1" noAdjustHandles="1" noChangeArrowheads="1" noChangeShapeType="1" noTextEdit="1"/>
+          </p:cNvSpPr>
+          <p:nvPr>
+            <p:extLst>
+              <p:ext uri="{386F3935-93C4-4BCD-93E2-E3B085C9AB24}">
+                <p16:designElem xmlns:p16="http://schemas.microsoft.com/office/powerpoint/2015/main" val="1"/>
+              </p:ext>
+            </p:extLst>
+          </p:nvPr>
+        </p:nvSpPr>
+        <p:spPr>
+          <a:xfrm rot="5400000">
+            <a:off x="7126032" y="1067264"/>
+            <a:ext cx="1021458" cy="18288"/>
+          </a:xfrm>
+          <a:prstGeom prst="rect">
+            <a:avLst/>
+          </a:prstGeom>
+          <a:solidFill>
+            <a:srgbClr val="D5D5D5"/>
+          </a:solidFill>
+          <a:ln w="3175">
+            <a:noFill/>
+          </a:ln>
+          <a:effectLst/>
+        </p:spPr>
+        <p:style>
+          <a:lnRef idx="2">
+            <a:schemeClr val="accent1">
+              <a:shade val="50000"/>
+            </a:schemeClr>
+          </a:lnRef>
+          <a:fillRef idx="1">
+            <a:schemeClr val="accent1"/>
+          </a:fillRef>
+          <a:effectRef idx="0">
+            <a:schemeClr val="accent1"/>
+          </a:effectRef>
+          <a:fontRef idx="minor">
+            <a:schemeClr val="lt1"/>
+          </a:fontRef>
+        </p:style>
+        <p:txBody>
+          <a:bodyPr rtlCol="0" anchor="ctr"/>
+          <a:lstStyle/>
+          <a:p>
+            <a:pPr algn="ctr"/>
+            <a:endParaRPr lang="en-US">
+              <a:solidFill>
+                <a:prstClr val="white"/>
+              </a:solidFill>
+              <a:latin typeface="Calibri" panose="020F0502020204030204"/>
+            </a:endParaRPr>
+          </a:p>
+        </p:txBody>
+      </p:sp>
       <p:pic>
         <p:nvPicPr>
           <p:cNvPr id="4" name="Content Placeholder 3">
@@ -8987,74 +11190,6 @@
     <p:extLst>
       <p:ext uri="{BB962C8B-B14F-4D97-AF65-F5344CB8AC3E}">
         <p14:creationId xmlns:p14="http://schemas.microsoft.com/office/powerpoint/2010/main" val="2633931336"/>
-      </p:ext>
-    </p:extLst>
-  </p:cSld>
-  <p:clrMapOvr>
-    <a:masterClrMapping/>
-  </p:clrMapOvr>
-</p:sld>
-</file>
-
-<file path=ppt/slides/slide9.xml><?xml version="1.0" encoding="utf-8"?>
-<p:sld xmlns:a="http://schemas.openxmlformats.org/drawingml/2006/main" xmlns:r="http://schemas.openxmlformats.org/officeDocument/2006/relationships" xmlns:p="http://schemas.openxmlformats.org/presentationml/2006/main">
-  <p:cSld>
-    <p:spTree>
-      <p:nvGrpSpPr>
-        <p:cNvPr id="1" name=""/>
-        <p:cNvGrpSpPr/>
-        <p:nvPr/>
-      </p:nvGrpSpPr>
-      <p:grpSpPr>
-        <a:xfrm>
-          <a:off x="0" y="0"/>
-          <a:ext cx="0" cy="0"/>
-          <a:chOff x="0" y="0"/>
-          <a:chExt cx="0" cy="0"/>
-        </a:xfrm>
-      </p:grpSpPr>
-      <p:sp>
-        <p:nvSpPr>
-          <p:cNvPr id="2" name="Title 1">
-            <a:extLst>
-              <a:ext uri="{FF2B5EF4-FFF2-40B4-BE49-F238E27FC236}">
-                <a16:creationId xmlns:a16="http://schemas.microsoft.com/office/drawing/2014/main" id="{6420E36B-836F-D9C0-DE96-1C98126FB24D}"/>
-              </a:ext>
-            </a:extLst>
-          </p:cNvPr>
-          <p:cNvSpPr>
-            <a:spLocks noGrp="1"/>
-          </p:cNvSpPr>
-          <p:nvPr>
-            <p:ph type="title"/>
-          </p:nvPr>
-        </p:nvSpPr>
-        <p:spPr>
-          <a:xfrm>
-            <a:off x="1524000" y="2915901"/>
-            <a:ext cx="9144000" cy="1026197"/>
-          </a:xfrm>
-        </p:spPr>
-        <p:txBody>
-          <a:bodyPr vert="horz" lIns="91440" tIns="45720" rIns="91440" bIns="45720" rtlCol="0" anchor="b">
-            <a:normAutofit/>
-          </a:bodyPr>
-          <a:lstStyle/>
-          <a:p>
-            <a:pPr algn="ctr"/>
-            <a:r>
-              <a:rPr lang="en-US" sz="6600" b="1" dirty="0">
-                <a:latin typeface="Arial Rounded MT Bold" panose="020F0704030504030204" pitchFamily="34" charset="0"/>
-              </a:rPr>
-              <a:t>The Prototype </a:t>
-            </a:r>
-          </a:p>
-        </p:txBody>
-      </p:sp>
-    </p:spTree>
-    <p:extLst>
-      <p:ext uri="{BB962C8B-B14F-4D97-AF65-F5344CB8AC3E}">
-        <p14:creationId xmlns:p14="http://schemas.microsoft.com/office/powerpoint/2010/main" val="4138361576"/>
       </p:ext>
     </p:extLst>
   </p:cSld>

</xml_diff>